<commit_message>
adding zuul api gateway and supporting services
</commit_message>
<xml_diff>
--- a/API GATEWAY.pptx
+++ b/API GATEWAY.pptx
@@ -4,6 +4,9 @@
   <p:sldMasterIdLst>
     <p:sldMasterId id="2147483660" r:id="rId1"/>
   </p:sldMasterIdLst>
+  <p:notesMasterIdLst>
+    <p:notesMasterId r:id="rId15"/>
+  </p:notesMasterIdLst>
   <p:sldIdLst>
     <p:sldId id="256" r:id="rId2"/>
     <p:sldId id="259" r:id="rId3"/>
@@ -16,7 +19,8 @@
     <p:sldId id="265" r:id="rId10"/>
     <p:sldId id="267" r:id="rId11"/>
     <p:sldId id="262" r:id="rId12"/>
-    <p:sldId id="269" r:id="rId13"/>
+    <p:sldId id="270" r:id="rId13"/>
+    <p:sldId id="269" r:id="rId14"/>
   </p:sldIdLst>
   <p:sldSz cx="12192000" cy="6858000"/>
   <p:notesSz cx="6858000" cy="9144000"/>
@@ -121,6 +125,356 @@
     </p:ext>
   </p:extLst>
 </p:presentation>
+</file>
+
+<file path=ppt/notesMasters/notesMaster1.xml><?xml version="1.0" encoding="utf-8"?>
+<p:notesMaster xmlns:a="http://schemas.openxmlformats.org/drawingml/2006/main" xmlns:r="http://schemas.openxmlformats.org/officeDocument/2006/relationships" xmlns:p="http://schemas.openxmlformats.org/presentationml/2006/main">
+  <p:cSld>
+    <p:bg>
+      <p:bgRef idx="1001">
+        <a:schemeClr val="bg1"/>
+      </p:bgRef>
+    </p:bg>
+    <p:spTree>
+      <p:nvGrpSpPr>
+        <p:cNvPr id="1" name=""/>
+        <p:cNvGrpSpPr/>
+        <p:nvPr/>
+      </p:nvGrpSpPr>
+      <p:grpSpPr>
+        <a:xfrm>
+          <a:off x="0" y="0"/>
+          <a:ext cx="0" cy="0"/>
+          <a:chOff x="0" y="0"/>
+          <a:chExt cx="0" cy="0"/>
+        </a:xfrm>
+      </p:grpSpPr>
+      <p:sp>
+        <p:nvSpPr>
+          <p:cNvPr id="2" name="Header Placeholder 1"/>
+          <p:cNvSpPr>
+            <a:spLocks noGrp="1"/>
+          </p:cNvSpPr>
+          <p:nvPr>
+            <p:ph type="hdr" sz="quarter"/>
+          </p:nvPr>
+        </p:nvSpPr>
+        <p:spPr>
+          <a:xfrm>
+            <a:off x="0" y="0"/>
+            <a:ext cx="2971800" cy="458788"/>
+          </a:xfrm>
+          <a:prstGeom prst="rect">
+            <a:avLst/>
+          </a:prstGeom>
+        </p:spPr>
+        <p:txBody>
+          <a:bodyPr vert="horz" lIns="91440" tIns="45720" rIns="91440" bIns="45720" rtlCol="0"/>
+          <a:lstStyle>
+            <a:lvl1pPr algn="l">
+              <a:defRPr sz="1200"/>
+            </a:lvl1pPr>
+          </a:lstStyle>
+          <a:p>
+            <a:endParaRPr lang="en-IN"/>
+          </a:p>
+        </p:txBody>
+      </p:sp>
+      <p:sp>
+        <p:nvSpPr>
+          <p:cNvPr id="3" name="Date Placeholder 2"/>
+          <p:cNvSpPr>
+            <a:spLocks noGrp="1"/>
+          </p:cNvSpPr>
+          <p:nvPr>
+            <p:ph type="dt" idx="1"/>
+          </p:nvPr>
+        </p:nvSpPr>
+        <p:spPr>
+          <a:xfrm>
+            <a:off x="3884613" y="0"/>
+            <a:ext cx="2971800" cy="458788"/>
+          </a:xfrm>
+          <a:prstGeom prst="rect">
+            <a:avLst/>
+          </a:prstGeom>
+        </p:spPr>
+        <p:txBody>
+          <a:bodyPr vert="horz" lIns="91440" tIns="45720" rIns="91440" bIns="45720" rtlCol="0"/>
+          <a:lstStyle>
+            <a:lvl1pPr algn="r">
+              <a:defRPr sz="1200"/>
+            </a:lvl1pPr>
+          </a:lstStyle>
+          <a:p>
+            <a:fld id="{29D49088-D59E-4EC1-A973-C40FCEAEB171}" type="datetimeFigureOut">
+              <a:rPr lang="en-IN" smtClean="0"/>
+              <a:t>21-11-2019</a:t>
+            </a:fld>
+            <a:endParaRPr lang="en-IN"/>
+          </a:p>
+        </p:txBody>
+      </p:sp>
+      <p:sp>
+        <p:nvSpPr>
+          <p:cNvPr id="4" name="Slide Image Placeholder 3"/>
+          <p:cNvSpPr>
+            <a:spLocks noGrp="1" noRot="1" noChangeAspect="1"/>
+          </p:cNvSpPr>
+          <p:nvPr>
+            <p:ph type="sldImg" idx="2"/>
+          </p:nvPr>
+        </p:nvSpPr>
+        <p:spPr>
+          <a:xfrm>
+            <a:off x="685800" y="1143000"/>
+            <a:ext cx="5486400" cy="3086100"/>
+          </a:xfrm>
+          <a:prstGeom prst="rect">
+            <a:avLst/>
+          </a:prstGeom>
+          <a:noFill/>
+          <a:ln w="12700">
+            <a:solidFill>
+              <a:prstClr val="black"/>
+            </a:solidFill>
+          </a:ln>
+        </p:spPr>
+        <p:txBody>
+          <a:bodyPr vert="horz" lIns="91440" tIns="45720" rIns="91440" bIns="45720" rtlCol="0" anchor="ctr"/>
+          <a:lstStyle/>
+          <a:p>
+            <a:endParaRPr lang="en-IN"/>
+          </a:p>
+        </p:txBody>
+      </p:sp>
+      <p:sp>
+        <p:nvSpPr>
+          <p:cNvPr id="5" name="Notes Placeholder 4"/>
+          <p:cNvSpPr>
+            <a:spLocks noGrp="1"/>
+          </p:cNvSpPr>
+          <p:nvPr>
+            <p:ph type="body" sz="quarter" idx="3"/>
+          </p:nvPr>
+        </p:nvSpPr>
+        <p:spPr>
+          <a:xfrm>
+            <a:off x="685800" y="4400550"/>
+            <a:ext cx="5486400" cy="3600450"/>
+          </a:xfrm>
+          <a:prstGeom prst="rect">
+            <a:avLst/>
+          </a:prstGeom>
+        </p:spPr>
+        <p:txBody>
+          <a:bodyPr vert="horz" lIns="91440" tIns="45720" rIns="91440" bIns="45720" rtlCol="0"/>
+          <a:lstStyle/>
+          <a:p>
+            <a:pPr lvl="0"/>
+            <a:r>
+              <a:rPr lang="en-US"/>
+              <a:t>Click to edit Master text styles</a:t>
+            </a:r>
+          </a:p>
+          <a:p>
+            <a:pPr lvl="1"/>
+            <a:r>
+              <a:rPr lang="en-US"/>
+              <a:t>Second level</a:t>
+            </a:r>
+          </a:p>
+          <a:p>
+            <a:pPr lvl="2"/>
+            <a:r>
+              <a:rPr lang="en-US"/>
+              <a:t>Third level</a:t>
+            </a:r>
+          </a:p>
+          <a:p>
+            <a:pPr lvl="3"/>
+            <a:r>
+              <a:rPr lang="en-US"/>
+              <a:t>Fourth level</a:t>
+            </a:r>
+          </a:p>
+          <a:p>
+            <a:pPr lvl="4"/>
+            <a:r>
+              <a:rPr lang="en-US"/>
+              <a:t>Fifth level</a:t>
+            </a:r>
+            <a:endParaRPr lang="en-IN"/>
+          </a:p>
+        </p:txBody>
+      </p:sp>
+      <p:sp>
+        <p:nvSpPr>
+          <p:cNvPr id="6" name="Footer Placeholder 5"/>
+          <p:cNvSpPr>
+            <a:spLocks noGrp="1"/>
+          </p:cNvSpPr>
+          <p:nvPr>
+            <p:ph type="ftr" sz="quarter" idx="4"/>
+          </p:nvPr>
+        </p:nvSpPr>
+        <p:spPr>
+          <a:xfrm>
+            <a:off x="0" y="8685213"/>
+            <a:ext cx="2971800" cy="458787"/>
+          </a:xfrm>
+          <a:prstGeom prst="rect">
+            <a:avLst/>
+          </a:prstGeom>
+        </p:spPr>
+        <p:txBody>
+          <a:bodyPr vert="horz" lIns="91440" tIns="45720" rIns="91440" bIns="45720" rtlCol="0" anchor="b"/>
+          <a:lstStyle>
+            <a:lvl1pPr algn="l">
+              <a:defRPr sz="1200"/>
+            </a:lvl1pPr>
+          </a:lstStyle>
+          <a:p>
+            <a:endParaRPr lang="en-IN"/>
+          </a:p>
+        </p:txBody>
+      </p:sp>
+      <p:sp>
+        <p:nvSpPr>
+          <p:cNvPr id="7" name="Slide Number Placeholder 6"/>
+          <p:cNvSpPr>
+            <a:spLocks noGrp="1"/>
+          </p:cNvSpPr>
+          <p:nvPr>
+            <p:ph type="sldNum" sz="quarter" idx="5"/>
+          </p:nvPr>
+        </p:nvSpPr>
+        <p:spPr>
+          <a:xfrm>
+            <a:off x="3884613" y="8685213"/>
+            <a:ext cx="2971800" cy="458787"/>
+          </a:xfrm>
+          <a:prstGeom prst="rect">
+            <a:avLst/>
+          </a:prstGeom>
+        </p:spPr>
+        <p:txBody>
+          <a:bodyPr vert="horz" lIns="91440" tIns="45720" rIns="91440" bIns="45720" rtlCol="0" anchor="b"/>
+          <a:lstStyle>
+            <a:lvl1pPr algn="r">
+              <a:defRPr sz="1200"/>
+            </a:lvl1pPr>
+          </a:lstStyle>
+          <a:p>
+            <a:fld id="{88F9D9BD-E7F1-4B50-B3E3-8F8F7F2AAF48}" type="slidenum">
+              <a:rPr lang="en-IN" smtClean="0"/>
+              <a:t>‹#›</a:t>
+            </a:fld>
+            <a:endParaRPr lang="en-IN"/>
+          </a:p>
+        </p:txBody>
+      </p:sp>
+    </p:spTree>
+    <p:extLst>
+      <p:ext uri="{BB962C8B-B14F-4D97-AF65-F5344CB8AC3E}">
+        <p14:creationId xmlns:p14="http://schemas.microsoft.com/office/powerpoint/2010/main" val="3570246369"/>
+      </p:ext>
+    </p:extLst>
+  </p:cSld>
+  <p:clrMap bg1="lt1" tx1="dk1" bg2="lt2" tx2="dk2" accent1="accent1" accent2="accent2" accent3="accent3" accent4="accent4" accent5="accent5" accent6="accent6" hlink="hlink" folHlink="folHlink"/>
+  <p:notesStyle>
+    <a:lvl1pPr marL="0" algn="l" defTabSz="914400" rtl="0" eaLnBrk="1" latinLnBrk="0" hangingPunct="1">
+      <a:defRPr sz="1200" kern="1200">
+        <a:solidFill>
+          <a:schemeClr val="tx1"/>
+        </a:solidFill>
+        <a:latin typeface="+mn-lt"/>
+        <a:ea typeface="+mn-ea"/>
+        <a:cs typeface="+mn-cs"/>
+      </a:defRPr>
+    </a:lvl1pPr>
+    <a:lvl2pPr marL="457200" algn="l" defTabSz="914400" rtl="0" eaLnBrk="1" latinLnBrk="0" hangingPunct="1">
+      <a:defRPr sz="1200" kern="1200">
+        <a:solidFill>
+          <a:schemeClr val="tx1"/>
+        </a:solidFill>
+        <a:latin typeface="+mn-lt"/>
+        <a:ea typeface="+mn-ea"/>
+        <a:cs typeface="+mn-cs"/>
+      </a:defRPr>
+    </a:lvl2pPr>
+    <a:lvl3pPr marL="914400" algn="l" defTabSz="914400" rtl="0" eaLnBrk="1" latinLnBrk="0" hangingPunct="1">
+      <a:defRPr sz="1200" kern="1200">
+        <a:solidFill>
+          <a:schemeClr val="tx1"/>
+        </a:solidFill>
+        <a:latin typeface="+mn-lt"/>
+        <a:ea typeface="+mn-ea"/>
+        <a:cs typeface="+mn-cs"/>
+      </a:defRPr>
+    </a:lvl3pPr>
+    <a:lvl4pPr marL="1371600" algn="l" defTabSz="914400" rtl="0" eaLnBrk="1" latinLnBrk="0" hangingPunct="1">
+      <a:defRPr sz="1200" kern="1200">
+        <a:solidFill>
+          <a:schemeClr val="tx1"/>
+        </a:solidFill>
+        <a:latin typeface="+mn-lt"/>
+        <a:ea typeface="+mn-ea"/>
+        <a:cs typeface="+mn-cs"/>
+      </a:defRPr>
+    </a:lvl4pPr>
+    <a:lvl5pPr marL="1828800" algn="l" defTabSz="914400" rtl="0" eaLnBrk="1" latinLnBrk="0" hangingPunct="1">
+      <a:defRPr sz="1200" kern="1200">
+        <a:solidFill>
+          <a:schemeClr val="tx1"/>
+        </a:solidFill>
+        <a:latin typeface="+mn-lt"/>
+        <a:ea typeface="+mn-ea"/>
+        <a:cs typeface="+mn-cs"/>
+      </a:defRPr>
+    </a:lvl5pPr>
+    <a:lvl6pPr marL="2286000" algn="l" defTabSz="914400" rtl="0" eaLnBrk="1" latinLnBrk="0" hangingPunct="1">
+      <a:defRPr sz="1200" kern="1200">
+        <a:solidFill>
+          <a:schemeClr val="tx1"/>
+        </a:solidFill>
+        <a:latin typeface="+mn-lt"/>
+        <a:ea typeface="+mn-ea"/>
+        <a:cs typeface="+mn-cs"/>
+      </a:defRPr>
+    </a:lvl6pPr>
+    <a:lvl7pPr marL="2743200" algn="l" defTabSz="914400" rtl="0" eaLnBrk="1" latinLnBrk="0" hangingPunct="1">
+      <a:defRPr sz="1200" kern="1200">
+        <a:solidFill>
+          <a:schemeClr val="tx1"/>
+        </a:solidFill>
+        <a:latin typeface="+mn-lt"/>
+        <a:ea typeface="+mn-ea"/>
+        <a:cs typeface="+mn-cs"/>
+      </a:defRPr>
+    </a:lvl7pPr>
+    <a:lvl8pPr marL="3200400" algn="l" defTabSz="914400" rtl="0" eaLnBrk="1" latinLnBrk="0" hangingPunct="1">
+      <a:defRPr sz="1200" kern="1200">
+        <a:solidFill>
+          <a:schemeClr val="tx1"/>
+        </a:solidFill>
+        <a:latin typeface="+mn-lt"/>
+        <a:ea typeface="+mn-ea"/>
+        <a:cs typeface="+mn-cs"/>
+      </a:defRPr>
+    </a:lvl8pPr>
+    <a:lvl9pPr marL="3657600" algn="l" defTabSz="914400" rtl="0" eaLnBrk="1" latinLnBrk="0" hangingPunct="1">
+      <a:defRPr sz="1200" kern="1200">
+        <a:solidFill>
+          <a:schemeClr val="tx1"/>
+        </a:solidFill>
+        <a:latin typeface="+mn-lt"/>
+        <a:ea typeface="+mn-ea"/>
+        <a:cs typeface="+mn-cs"/>
+      </a:defRPr>
+    </a:lvl9pPr>
+  </p:notesStyle>
+</p:notesMaster>
 </file>
 
 <file path=ppt/slideLayouts/slideLayout1.xml><?xml version="1.0" encoding="utf-8"?>
@@ -590,9 +944,9 @@
             </a:lvl1pPr>
           </a:lstStyle>
           <a:p>
-            <a:fld id="{EA0C0817-A112-4847-8014-A94B7D2A4EA3}" type="datetime1">
+            <a:fld id="{FAAFA0EE-FC22-403B-855F-DAAF8F492630}" type="datetime1">
               <a:rPr lang="en-US" smtClean="0"/>
-              <a:t>11/18/2019</a:t>
+              <a:t>11/21/2019</a:t>
             </a:fld>
             <a:endParaRPr lang="en-US" dirty="0"/>
           </a:p>
@@ -629,6 +983,10 @@
             </a:lvl1pPr>
           </a:lstStyle>
           <a:p>
+            <a:r>
+              <a:rPr lang="en-US"/>
+              <a:t>Follow us on https://facebook.com/greenlearner</a:t>
+            </a:r>
             <a:endParaRPr lang="en-US" dirty="0"/>
           </a:p>
         </p:txBody>
@@ -792,9 +1150,9 @@
           <a:bodyPr/>
           <a:lstStyle/>
           <a:p>
-            <a:fld id="{134F40B7-36AB-4376-BE14-EF7004D79BB9}" type="datetime1">
+            <a:fld id="{D83CC6DA-3E64-4C3C-BA46-C617B6E06949}" type="datetime1">
               <a:rPr lang="en-US" smtClean="0"/>
-              <a:t>11/18/2019</a:t>
+              <a:t>11/21/2019</a:t>
             </a:fld>
             <a:endParaRPr lang="en-US"/>
           </a:p>
@@ -815,7 +1173,10 @@
           <a:bodyPr/>
           <a:lstStyle/>
           <a:p>
-            <a:endParaRPr lang="en-US"/>
+            <a:r>
+              <a:rPr lang="en-US"/>
+              <a:t>Follow us on https://facebook.com/greenlearner</a:t>
+            </a:r>
           </a:p>
         </p:txBody>
       </p:sp>
@@ -972,9 +1333,9 @@
           <a:bodyPr/>
           <a:lstStyle/>
           <a:p>
-            <a:fld id="{FF87CAB8-DCAE-46A5-AADA-B3FAD11A54E0}" type="datetime1">
+            <a:fld id="{C053DABC-2164-409F-B229-9168892EB728}" type="datetime1">
               <a:rPr lang="en-US" smtClean="0"/>
-              <a:t>11/18/2019</a:t>
+              <a:t>11/21/2019</a:t>
             </a:fld>
             <a:endParaRPr lang="en-US"/>
           </a:p>
@@ -995,7 +1356,10 @@
           <a:bodyPr/>
           <a:lstStyle/>
           <a:p>
-            <a:endParaRPr lang="en-US"/>
+            <a:r>
+              <a:rPr lang="en-US"/>
+              <a:t>Follow us on https://facebook.com/greenlearner</a:t>
+            </a:r>
           </a:p>
         </p:txBody>
       </p:sp>
@@ -1142,9 +1506,9 @@
           <a:bodyPr/>
           <a:lstStyle/>
           <a:p>
-            <a:fld id="{7332B432-ACDA-4023-A761-2BAB76577B62}" type="datetime1">
+            <a:fld id="{FA4FF048-2037-4ADD-A1BA-BB671EDED226}" type="datetime1">
               <a:rPr lang="en-US" smtClean="0"/>
-              <a:t>11/18/2019</a:t>
+              <a:t>11/21/2019</a:t>
             </a:fld>
             <a:endParaRPr lang="en-US"/>
           </a:p>
@@ -1165,7 +1529,10 @@
           <a:bodyPr/>
           <a:lstStyle/>
           <a:p>
-            <a:endParaRPr lang="en-US"/>
+            <a:r>
+              <a:rPr lang="en-US"/>
+              <a:t>Follow us on https://facebook.com/greenlearner</a:t>
+            </a:r>
           </a:p>
         </p:txBody>
       </p:sp>
@@ -1741,9 +2108,9 @@
             </a:lvl1pPr>
           </a:lstStyle>
           <a:p>
-            <a:fld id="{D9C646AA-F36E-4540-911D-FFFC0A0EF24A}" type="datetime1">
+            <a:fld id="{C927C907-611A-4922-B8D1-C95EC55F8EF1}" type="datetime1">
               <a:rPr lang="en-US" smtClean="0"/>
-              <a:t>11/18/2019</a:t>
+              <a:t>11/21/2019</a:t>
             </a:fld>
             <a:endParaRPr lang="en-US" dirty="0"/>
           </a:p>
@@ -1780,6 +2147,10 @@
             </a:lvl1pPr>
           </a:lstStyle>
           <a:p>
+            <a:r>
+              <a:rPr lang="en-US"/>
+              <a:t>Follow us on https://facebook.com/greenlearner</a:t>
+            </a:r>
             <a:endParaRPr lang="en-US" dirty="0"/>
           </a:p>
         </p:txBody>
@@ -2061,9 +2432,9 @@
           <a:bodyPr/>
           <a:lstStyle/>
           <a:p>
-            <a:fld id="{69186D26-FA5F-4637-B602-B7C2DC34CFD4}" type="datetime1">
+            <a:fld id="{2B0B8BC9-9661-48F0-B5A3-41091A8EA392}" type="datetime1">
               <a:rPr lang="en-US" smtClean="0"/>
-              <a:t>11/18/2019</a:t>
+              <a:t>11/21/2019</a:t>
             </a:fld>
             <a:endParaRPr lang="en-US"/>
           </a:p>
@@ -2084,7 +2455,10 @@
           <a:bodyPr/>
           <a:lstStyle/>
           <a:p>
-            <a:endParaRPr lang="en-US"/>
+            <a:r>
+              <a:rPr lang="en-US"/>
+              <a:t>Follow us on https://facebook.com/greenlearner</a:t>
+            </a:r>
           </a:p>
         </p:txBody>
       </p:sp>
@@ -2496,9 +2870,9 @@
           <a:bodyPr/>
           <a:lstStyle/>
           <a:p>
-            <a:fld id="{8A7F15D8-96D1-4781-BC50-CA8A088B2FE4}" type="datetime1">
+            <a:fld id="{925DA980-4AC7-47AC-99D6-21B66B274D39}" type="datetime1">
               <a:rPr lang="en-US" smtClean="0"/>
-              <a:t>11/18/2019</a:t>
+              <a:t>11/21/2019</a:t>
             </a:fld>
             <a:endParaRPr lang="en-US"/>
           </a:p>
@@ -2519,7 +2893,10 @@
           <a:bodyPr/>
           <a:lstStyle/>
           <a:p>
-            <a:endParaRPr lang="en-US"/>
+            <a:r>
+              <a:rPr lang="en-US"/>
+              <a:t>Follow us on https://facebook.com/greenlearner</a:t>
+            </a:r>
           </a:p>
         </p:txBody>
       </p:sp>
@@ -2614,9 +2991,9 @@
           <a:bodyPr/>
           <a:lstStyle/>
           <a:p>
-            <a:fld id="{F9A96C99-B8F8-4528-BD05-0E16E943DC09}" type="datetime1">
+            <a:fld id="{0368E61E-3A42-40DA-BDA1-B7ACB1C7BE04}" type="datetime1">
               <a:rPr lang="en-US" smtClean="0"/>
-              <a:t>11/18/2019</a:t>
+              <a:t>11/21/2019</a:t>
             </a:fld>
             <a:endParaRPr lang="en-US"/>
           </a:p>
@@ -2637,7 +3014,10 @@
           <a:bodyPr/>
           <a:lstStyle/>
           <a:p>
-            <a:endParaRPr lang="en-US"/>
+            <a:r>
+              <a:rPr lang="en-US"/>
+              <a:t>Follow us on https://facebook.com/greenlearner</a:t>
+            </a:r>
           </a:p>
         </p:txBody>
       </p:sp>
@@ -2709,9 +3089,9 @@
           <a:bodyPr/>
           <a:lstStyle/>
           <a:p>
-            <a:fld id="{03636942-C211-4B28-8DBD-C953E00AF71B}" type="datetime1">
+            <a:fld id="{134BDC21-163D-4070-A07E-D7DB5B50B0A1}" type="datetime1">
               <a:rPr lang="en-US" smtClean="0"/>
-              <a:t>11/18/2019</a:t>
+              <a:t>11/21/2019</a:t>
             </a:fld>
             <a:endParaRPr lang="en-US"/>
           </a:p>
@@ -2732,7 +3112,10 @@
           <a:bodyPr/>
           <a:lstStyle/>
           <a:p>
-            <a:endParaRPr lang="en-US"/>
+            <a:r>
+              <a:rPr lang="en-US"/>
+              <a:t>Follow us on https://facebook.com/greenlearner</a:t>
+            </a:r>
           </a:p>
         </p:txBody>
       </p:sp>
@@ -3126,9 +3509,9 @@
             </a:lvl1pPr>
           </a:lstStyle>
           <a:p>
-            <a:fld id="{7E8D12A6-918A-48BD-8CB9-CA713993B0EA}" type="datetime1">
+            <a:fld id="{62C90643-F18E-4794-95F2-93E0F7C4F083}" type="datetime1">
               <a:rPr lang="en-US" smtClean="0"/>
-              <a:t>11/18/2019</a:t>
+              <a:t>11/21/2019</a:t>
             </a:fld>
             <a:endParaRPr lang="en-US"/>
           </a:p>
@@ -3158,7 +3541,10 @@
             </a:lvl1pPr>
           </a:lstStyle>
           <a:p>
-            <a:endParaRPr lang="en-US"/>
+            <a:r>
+              <a:rPr lang="en-US"/>
+              <a:t>Follow us on https://facebook.com/greenlearner</a:t>
+            </a:r>
           </a:p>
         </p:txBody>
       </p:sp>
@@ -3387,10 +3773,9 @@
             </a:lvl1pPr>
           </a:lstStyle>
           <a:p>
-            <a:fld id="{E778CE86-875F-4587-BCF6-FA054AFC0D53}" type="datetime1">
+            <a:fld id="{D20948EB-4B61-4CC1-9B49-5837A633AA85}" type="datetime1">
               <a:rPr lang="en-US" smtClean="0"/>
-              <a:pPr/>
-              <a:t>11/18/2019</a:t>
+              <a:t>11/21/2019</a:t>
             </a:fld>
             <a:endParaRPr lang="en-US" dirty="0"/>
           </a:p>
@@ -3435,6 +3820,10 @@
           </a:lstStyle>
           <a:p>
             <a:pPr algn="l"/>
+            <a:r>
+              <a:rPr lang="en-US"/>
+              <a:t>Follow us on https://facebook.com/greenlearner</a:t>
+            </a:r>
             <a:endParaRPr lang="en-US" dirty="0"/>
           </a:p>
         </p:txBody>
@@ -3904,9 +4293,9 @@
             </a:lvl1pPr>
           </a:lstStyle>
           <a:p>
-            <a:fld id="{F6FA2B21-3FCD-4721-B95C-427943F61125}" type="datetime1">
+            <a:fld id="{0CB3BB2D-4272-4975-8236-05D3D7A52D68}" type="datetime1">
               <a:rPr lang="en-US" smtClean="0"/>
-              <a:t>11/18/2019</a:t>
+              <a:t>11/21/2019</a:t>
             </a:fld>
             <a:endParaRPr lang="en-US"/>
           </a:p>
@@ -3946,6 +4335,10 @@
             </a:lvl1pPr>
           </a:lstStyle>
           <a:p>
+            <a:r>
+              <a:rPr lang="en-US"/>
+              <a:t>Follow us on https://facebook.com/greenlearner</a:t>
+            </a:r>
             <a:endParaRPr lang="en-US" dirty="0"/>
           </a:p>
         </p:txBody>
@@ -4013,7 +4406,7 @@
     <p:sldLayoutId id="2147483662" r:id="rId10"/>
     <p:sldLayoutId id="2147483661" r:id="rId11"/>
   </p:sldLayoutIdLst>
-  <p:hf sldNum="0" hdr="0" ftr="0" dt="0"/>
+  <p:hf sldNum="0" hdr="0" dt="0"/>
   <p:txStyles>
     <p:titleStyle>
       <a:lvl1pPr algn="l" defTabSz="914400" rtl="0" eaLnBrk="1" latinLnBrk="0" hangingPunct="1">
@@ -4603,8 +4996,8 @@
         </p:blipFill>
         <p:spPr>
           <a:xfrm>
-            <a:off x="7956973" y="4519212"/>
-            <a:ext cx="4235006" cy="2329254"/>
+            <a:off x="7956994" y="4519212"/>
+            <a:ext cx="4235006" cy="1891113"/>
           </a:xfrm>
           <a:prstGeom prst="rect">
             <a:avLst/>
@@ -4643,8 +5036,8 @@
         </p:blipFill>
         <p:spPr>
           <a:xfrm>
-            <a:off x="0" y="4528736"/>
-            <a:ext cx="3952875" cy="2329254"/>
+            <a:off x="161925" y="4519212"/>
+            <a:ext cx="3952875" cy="1881589"/>
           </a:xfrm>
           <a:prstGeom prst="rect">
             <a:avLst/>
@@ -4676,7 +5069,7 @@
         <p:spPr>
           <a:xfrm>
             <a:off x="1" y="-28570"/>
-            <a:ext cx="1104900" cy="428620"/>
+            <a:ext cx="1381124" cy="428620"/>
           </a:xfrm>
           <a:prstGeom prst="snip1Rect">
             <a:avLst/>
@@ -4707,6 +5100,35 @@
               <a:rPr lang="en-IN" b="1" dirty="0"/>
               <a:t>ARVIND</a:t>
             </a:r>
+          </a:p>
+        </p:txBody>
+      </p:sp>
+      <p:sp>
+        <p:nvSpPr>
+          <p:cNvPr id="6" name="Footer Placeholder 5">
+            <a:extLst>
+              <a:ext uri="{FF2B5EF4-FFF2-40B4-BE49-F238E27FC236}">
+                <a16:creationId xmlns:a16="http://schemas.microsoft.com/office/drawing/2014/main" id="{16343555-B78F-4C62-9814-8C6193A9BF9A}"/>
+              </a:ext>
+            </a:extLst>
+          </p:cNvPr>
+          <p:cNvSpPr>
+            <a:spLocks noGrp="1"/>
+          </p:cNvSpPr>
+          <p:nvPr>
+            <p:ph type="ftr" sz="quarter" idx="11"/>
+          </p:nvPr>
+        </p:nvSpPr>
+        <p:spPr/>
+        <p:txBody>
+          <a:bodyPr/>
+          <a:lstStyle/>
+          <a:p>
+            <a:r>
+              <a:rPr lang="en-US"/>
+              <a:t>Follow us on https://facebook.com/greenlearner</a:t>
+            </a:r>
+            <a:endParaRPr lang="en-US" dirty="0"/>
           </a:p>
         </p:txBody>
       </p:sp>
@@ -4838,6 +5260,34 @@
             <a:r>
               <a:rPr lang="en-IN" sz="2000" dirty="0"/>
               <a:t>One point failure</a:t>
+            </a:r>
+          </a:p>
+        </p:txBody>
+      </p:sp>
+      <p:sp>
+        <p:nvSpPr>
+          <p:cNvPr id="4" name="Footer Placeholder 3">
+            <a:extLst>
+              <a:ext uri="{FF2B5EF4-FFF2-40B4-BE49-F238E27FC236}">
+                <a16:creationId xmlns:a16="http://schemas.microsoft.com/office/drawing/2014/main" id="{CEDAC28D-F607-49B7-8F4B-C2AE53F74A76}"/>
+              </a:ext>
+            </a:extLst>
+          </p:cNvPr>
+          <p:cNvSpPr>
+            <a:spLocks noGrp="1"/>
+          </p:cNvSpPr>
+          <p:nvPr>
+            <p:ph type="ftr" sz="quarter" idx="11"/>
+          </p:nvPr>
+        </p:nvSpPr>
+        <p:spPr/>
+        <p:txBody>
+          <a:bodyPr/>
+          <a:lstStyle/>
+          <a:p>
+            <a:r>
+              <a:rPr lang="en-US"/>
+              <a:t>Follow us on https://facebook.com/greenlearner</a:t>
             </a:r>
           </a:p>
         </p:txBody>
@@ -5495,6 +5945,34 @@
           </a:effectLst>
         </p:spPr>
       </p:pic>
+      <p:sp>
+        <p:nvSpPr>
+          <p:cNvPr id="6" name="Footer Placeholder 5">
+            <a:extLst>
+              <a:ext uri="{FF2B5EF4-FFF2-40B4-BE49-F238E27FC236}">
+                <a16:creationId xmlns:a16="http://schemas.microsoft.com/office/drawing/2014/main" id="{FB68AF80-D8B6-41FD-9FB7-E09678F9E24D}"/>
+              </a:ext>
+            </a:extLst>
+          </p:cNvPr>
+          <p:cNvSpPr>
+            <a:spLocks noGrp="1"/>
+          </p:cNvSpPr>
+          <p:nvPr>
+            <p:ph type="ftr" sz="quarter" idx="11"/>
+          </p:nvPr>
+        </p:nvSpPr>
+        <p:spPr/>
+        <p:txBody>
+          <a:bodyPr/>
+          <a:lstStyle/>
+          <a:p>
+            <a:r>
+              <a:rPr lang="en-US"/>
+              <a:t>Follow us on https://facebook.com/greenlearner</a:t>
+            </a:r>
+          </a:p>
+        </p:txBody>
+      </p:sp>
     </p:spTree>
     <p:extLst>
       <p:ext uri="{BB962C8B-B14F-4D97-AF65-F5344CB8AC3E}">
@@ -5739,6 +6217,304 @@
 <file path=ppt/slides/slide12.xml><?xml version="1.0" encoding="utf-8"?>
 <p:sld xmlns:a="http://schemas.openxmlformats.org/drawingml/2006/main" xmlns:r="http://schemas.openxmlformats.org/officeDocument/2006/relationships" xmlns:p="http://schemas.openxmlformats.org/presentationml/2006/main">
   <p:cSld>
+    <p:bg>
+      <p:bgPr>
+        <a:solidFill>
+          <a:schemeClr val="bg1"/>
+        </a:solidFill>
+        <a:effectLst/>
+      </p:bgPr>
+    </p:bg>
+    <p:spTree>
+      <p:nvGrpSpPr>
+        <p:cNvPr id="1" name=""/>
+        <p:cNvGrpSpPr/>
+        <p:nvPr/>
+      </p:nvGrpSpPr>
+      <p:grpSpPr>
+        <a:xfrm>
+          <a:off x="0" y="0"/>
+          <a:ext cx="0" cy="0"/>
+          <a:chOff x="0" y="0"/>
+          <a:chExt cx="0" cy="0"/>
+        </a:xfrm>
+      </p:grpSpPr>
+      <p:pic>
+        <p:nvPicPr>
+          <p:cNvPr id="15" name="Picture 3">
+            <a:extLst>
+              <a:ext uri="{FF2B5EF4-FFF2-40B4-BE49-F238E27FC236}">
+                <a16:creationId xmlns:a16="http://schemas.microsoft.com/office/drawing/2014/main" id="{0785719F-1A65-49E3-AC9E-639309D4D0B0}"/>
+              </a:ext>
+            </a:extLst>
+          </p:cNvPr>
+          <p:cNvPicPr>
+            <a:picLocks noChangeAspect="1"/>
+          </p:cNvPicPr>
+          <p:nvPr/>
+        </p:nvPicPr>
+        <p:blipFill rotWithShape="1">
+          <a:blip r:embed="rId3"/>
+          <a:srcRect t="15730"/>
+          <a:stretch/>
+        </p:blipFill>
+        <p:spPr>
+          <a:xfrm>
+            <a:off x="21" y="-9524"/>
+            <a:ext cx="12191979" cy="6857990"/>
+          </a:xfrm>
+          <a:prstGeom prst="rect">
+            <a:avLst/>
+          </a:prstGeom>
+        </p:spPr>
+      </p:pic>
+      <p:sp>
+        <p:nvSpPr>
+          <p:cNvPr id="2" name="Title 1">
+            <a:extLst>
+              <a:ext uri="{FF2B5EF4-FFF2-40B4-BE49-F238E27FC236}">
+                <a16:creationId xmlns:a16="http://schemas.microsoft.com/office/drawing/2014/main" id="{5ED652C6-48A8-4B7E-94C4-A6E2E1AF0767}"/>
+              </a:ext>
+            </a:extLst>
+          </p:cNvPr>
+          <p:cNvSpPr>
+            <a:spLocks noGrp="1"/>
+          </p:cNvSpPr>
+          <p:nvPr>
+            <p:ph type="ctrTitle"/>
+          </p:nvPr>
+        </p:nvSpPr>
+        <p:spPr>
+          <a:xfrm>
+            <a:off x="1381125" y="333374"/>
+            <a:ext cx="9496425" cy="4162426"/>
+          </a:xfrm>
+          <a:solidFill>
+            <a:srgbClr val="92D050"/>
+          </a:solidFill>
+        </p:spPr>
+        <p:txBody>
+          <a:bodyPr>
+            <a:normAutofit/>
+          </a:bodyPr>
+          <a:lstStyle/>
+          <a:p>
+            <a:r>
+              <a:rPr lang="en-IN" sz="8000" b="1" dirty="0">
+                <a:solidFill>
+                  <a:schemeClr val="tx1"/>
+                </a:solidFill>
+                <a:latin typeface="Algerian" panose="04020705040A02060702" pitchFamily="82" charset="0"/>
+              </a:rPr>
+              <a:t>API GATEWAY</a:t>
+            </a:r>
+            <a:br>
+              <a:rPr lang="en-IN" sz="8000" b="1" dirty="0">
+                <a:solidFill>
+                  <a:schemeClr val="tx1"/>
+                </a:solidFill>
+                <a:latin typeface="Algerian" panose="04020705040A02060702" pitchFamily="82" charset="0"/>
+              </a:rPr>
+            </a:br>
+            <a:r>
+              <a:rPr lang="en-IN" sz="8000" b="1" dirty="0">
+                <a:solidFill>
+                  <a:schemeClr val="tx1"/>
+                </a:solidFill>
+                <a:latin typeface="Algerian" panose="04020705040A02060702" pitchFamily="82" charset="0"/>
+              </a:rPr>
+              <a:t>in</a:t>
+            </a:r>
+            <a:br>
+              <a:rPr lang="en-IN" sz="8000" b="1" dirty="0">
+                <a:solidFill>
+                  <a:schemeClr val="tx1"/>
+                </a:solidFill>
+                <a:latin typeface="Algerian" panose="04020705040A02060702" pitchFamily="82" charset="0"/>
+              </a:rPr>
+            </a:br>
+            <a:r>
+              <a:rPr lang="en-IN" sz="8000" b="1" dirty="0">
+                <a:solidFill>
+                  <a:schemeClr val="tx1"/>
+                </a:solidFill>
+                <a:latin typeface="Algerian" panose="04020705040A02060702" pitchFamily="82" charset="0"/>
+              </a:rPr>
+              <a:t>microservices</a:t>
+            </a:r>
+            <a:br>
+              <a:rPr lang="en-IN" sz="8000" b="1" dirty="0">
+                <a:solidFill>
+                  <a:schemeClr val="tx1"/>
+                </a:solidFill>
+                <a:latin typeface="Algerian" panose="04020705040A02060702" pitchFamily="82" charset="0"/>
+              </a:rPr>
+            </a:br>
+            <a:r>
+              <a:rPr lang="en-IN" sz="8000" b="1" dirty="0">
+                <a:solidFill>
+                  <a:srgbClr val="FF0000"/>
+                </a:solidFill>
+                <a:latin typeface="Algerian" panose="04020705040A02060702" pitchFamily="82" charset="0"/>
+              </a:rPr>
+              <a:t>Netflix </a:t>
+            </a:r>
+            <a:r>
+              <a:rPr lang="en-IN" sz="8000" b="1" dirty="0" err="1">
+                <a:solidFill>
+                  <a:srgbClr val="FF0000"/>
+                </a:solidFill>
+                <a:latin typeface="Algerian" panose="04020705040A02060702" pitchFamily="82" charset="0"/>
+              </a:rPr>
+              <a:t>Zuul</a:t>
+            </a:r>
+            <a:endParaRPr lang="en-IN" sz="13800" b="1" dirty="0">
+              <a:solidFill>
+                <a:srgbClr val="FF0000"/>
+              </a:solidFill>
+              <a:latin typeface="Algerian" panose="04020705040A02060702" pitchFamily="82" charset="0"/>
+            </a:endParaRPr>
+          </a:p>
+        </p:txBody>
+      </p:sp>
+      <p:sp>
+        <p:nvSpPr>
+          <p:cNvPr id="5" name="Rectangle: Single Corner Snipped 4">
+            <a:extLst>
+              <a:ext uri="{FF2B5EF4-FFF2-40B4-BE49-F238E27FC236}">
+                <a16:creationId xmlns:a16="http://schemas.microsoft.com/office/drawing/2014/main" id="{C2B582A3-2343-4328-B6E9-EBBD7996AA9D}"/>
+              </a:ext>
+            </a:extLst>
+          </p:cNvPr>
+          <p:cNvSpPr/>
+          <p:nvPr/>
+        </p:nvSpPr>
+        <p:spPr>
+          <a:xfrm>
+            <a:off x="1" y="-28570"/>
+            <a:ext cx="1381124" cy="428620"/>
+          </a:xfrm>
+          <a:prstGeom prst="snip1Rect">
+            <a:avLst/>
+          </a:prstGeom>
+        </p:spPr>
+        <p:style>
+          <a:lnRef idx="2">
+            <a:schemeClr val="accent1">
+              <a:shade val="50000"/>
+            </a:schemeClr>
+          </a:lnRef>
+          <a:fillRef idx="1">
+            <a:schemeClr val="accent1"/>
+          </a:fillRef>
+          <a:effectRef idx="0">
+            <a:schemeClr val="accent1"/>
+          </a:effectRef>
+          <a:fontRef idx="minor">
+            <a:schemeClr val="lt1"/>
+          </a:fontRef>
+        </p:style>
+        <p:txBody>
+          <a:bodyPr rtlCol="0" anchor="ctr"/>
+          <a:lstStyle/>
+          <a:p>
+            <a:pPr algn="ctr"/>
+            <a:r>
+              <a:rPr lang="en-IN" b="1" dirty="0"/>
+              <a:t>ARVIND</a:t>
+            </a:r>
+          </a:p>
+        </p:txBody>
+      </p:sp>
+      <p:pic>
+        <p:nvPicPr>
+          <p:cNvPr id="9" name="Picture 8">
+            <a:extLst>
+              <a:ext uri="{FF2B5EF4-FFF2-40B4-BE49-F238E27FC236}">
+                <a16:creationId xmlns:a16="http://schemas.microsoft.com/office/drawing/2014/main" id="{559E28E8-6B4D-4759-9471-A270BA38F909}"/>
+              </a:ext>
+            </a:extLst>
+          </p:cNvPr>
+          <p:cNvPicPr>
+            <a:picLocks noChangeAspect="1"/>
+          </p:cNvPicPr>
+          <p:nvPr/>
+        </p:nvPicPr>
+        <p:blipFill>
+          <a:blip r:embed="rId4"/>
+          <a:stretch>
+            <a:fillRect/>
+          </a:stretch>
+        </p:blipFill>
+        <p:spPr>
+          <a:xfrm>
+            <a:off x="3933825" y="4495800"/>
+            <a:ext cx="4262193" cy="2028826"/>
+          </a:xfrm>
+          <a:prstGeom prst="rect">
+            <a:avLst/>
+          </a:prstGeom>
+          <a:ln>
+            <a:noFill/>
+          </a:ln>
+          <a:effectLst>
+            <a:outerShdw blurRad="292100" dist="139700" dir="2700000" algn="tl" rotWithShape="0">
+              <a:srgbClr val="333333">
+                <a:alpha val="65000"/>
+              </a:srgbClr>
+            </a:outerShdw>
+          </a:effectLst>
+        </p:spPr>
+      </p:pic>
+      <p:sp>
+        <p:nvSpPr>
+          <p:cNvPr id="6" name="Footer Placeholder 5">
+            <a:extLst>
+              <a:ext uri="{FF2B5EF4-FFF2-40B4-BE49-F238E27FC236}">
+                <a16:creationId xmlns:a16="http://schemas.microsoft.com/office/drawing/2014/main" id="{27BCB787-CA0B-4A63-8585-D7FB76B4BE4D}"/>
+              </a:ext>
+            </a:extLst>
+          </p:cNvPr>
+          <p:cNvSpPr>
+            <a:spLocks noGrp="1"/>
+          </p:cNvSpPr>
+          <p:nvPr>
+            <p:ph type="ftr" sz="quarter" idx="11"/>
+          </p:nvPr>
+        </p:nvSpPr>
+        <p:spPr>
+          <a:xfrm>
+            <a:off x="0" y="6619866"/>
+            <a:ext cx="5730295" cy="228600"/>
+          </a:xfrm>
+        </p:spPr>
+        <p:txBody>
+          <a:bodyPr/>
+          <a:lstStyle/>
+          <a:p>
+            <a:r>
+              <a:rPr lang="en-US" dirty="0"/>
+              <a:t>Follow us on https://facebook.com/greenlearner</a:t>
+            </a:r>
+          </a:p>
+        </p:txBody>
+      </p:sp>
+    </p:spTree>
+    <p:extLst>
+      <p:ext uri="{BB962C8B-B14F-4D97-AF65-F5344CB8AC3E}">
+        <p14:creationId xmlns:p14="http://schemas.microsoft.com/office/powerpoint/2010/main" val="4165002554"/>
+      </p:ext>
+    </p:extLst>
+  </p:cSld>
+  <p:clrMapOvr>
+    <a:overrideClrMapping bg1="dk1" tx1="lt1" bg2="dk2" tx2="lt2" accent1="accent1" accent2="accent2" accent3="accent3" accent4="accent4" accent5="accent5" accent6="accent6" hlink="hlink" folHlink="folHlink"/>
+  </p:clrMapOvr>
+</p:sld>
+</file>
+
+<file path=ppt/slides/slide13.xml><?xml version="1.0" encoding="utf-8"?>
+<p:sld xmlns:a="http://schemas.openxmlformats.org/drawingml/2006/main" xmlns:r="http://schemas.openxmlformats.org/officeDocument/2006/relationships" xmlns:p="http://schemas.openxmlformats.org/presentationml/2006/main">
+  <p:cSld>
     <p:spTree>
       <p:nvGrpSpPr>
         <p:cNvPr id="1" name=""/>
@@ -5799,6 +6575,34 @@
             <a:r>
               <a:rPr lang="en-IN" sz="6600" u="sng" dirty="0"/>
               <a:t>Thanks for your time</a:t>
+            </a:r>
+          </a:p>
+        </p:txBody>
+      </p:sp>
+      <p:sp>
+        <p:nvSpPr>
+          <p:cNvPr id="7" name="Footer Placeholder 6">
+            <a:extLst>
+              <a:ext uri="{FF2B5EF4-FFF2-40B4-BE49-F238E27FC236}">
+                <a16:creationId xmlns:a16="http://schemas.microsoft.com/office/drawing/2014/main" id="{53BE71D0-10C0-4179-9309-9FE5130D702A}"/>
+              </a:ext>
+            </a:extLst>
+          </p:cNvPr>
+          <p:cNvSpPr>
+            <a:spLocks noGrp="1"/>
+          </p:cNvSpPr>
+          <p:nvPr>
+            <p:ph type="ftr" sz="quarter" idx="11"/>
+          </p:nvPr>
+        </p:nvSpPr>
+        <p:spPr/>
+        <p:txBody>
+          <a:bodyPr/>
+          <a:lstStyle/>
+          <a:p>
+            <a:r>
+              <a:rPr lang="en-US"/>
+              <a:t>Follow us on https://facebook.com/greenlearner</a:t>
             </a:r>
           </a:p>
         </p:txBody>
@@ -6661,6 +7465,34 @@
           </a:fontRef>
         </p:style>
       </p:cxnSp>
+      <p:sp>
+        <p:nvSpPr>
+          <p:cNvPr id="24" name="Footer Placeholder 23">
+            <a:extLst>
+              <a:ext uri="{FF2B5EF4-FFF2-40B4-BE49-F238E27FC236}">
+                <a16:creationId xmlns:a16="http://schemas.microsoft.com/office/drawing/2014/main" id="{31361378-F10D-4751-9450-A217823A9F04}"/>
+              </a:ext>
+            </a:extLst>
+          </p:cNvPr>
+          <p:cNvSpPr>
+            <a:spLocks noGrp="1"/>
+          </p:cNvSpPr>
+          <p:nvPr>
+            <p:ph type="ftr" sz="quarter" idx="11"/>
+          </p:nvPr>
+        </p:nvSpPr>
+        <p:spPr/>
+        <p:txBody>
+          <a:bodyPr/>
+          <a:lstStyle/>
+          <a:p>
+            <a:r>
+              <a:rPr lang="en-US"/>
+              <a:t>Follow us on https://facebook.com/greenlearner</a:t>
+            </a:r>
+          </a:p>
+        </p:txBody>
+      </p:sp>
     </p:spTree>
     <p:extLst>
       <p:ext uri="{BB962C8B-B14F-4D97-AF65-F5344CB8AC3E}">
@@ -6791,6 +7623,34 @@
             <a:r>
               <a:rPr lang="en-IN" sz="1800" dirty="0"/>
               <a:t>Some mid layer to manage the address of microservices and clients have address of this mid layer service?</a:t>
+            </a:r>
+          </a:p>
+        </p:txBody>
+      </p:sp>
+      <p:sp>
+        <p:nvSpPr>
+          <p:cNvPr id="4" name="Footer Placeholder 3">
+            <a:extLst>
+              <a:ext uri="{FF2B5EF4-FFF2-40B4-BE49-F238E27FC236}">
+                <a16:creationId xmlns:a16="http://schemas.microsoft.com/office/drawing/2014/main" id="{CA474FD2-2738-4AA1-9F8A-9729DB2CEDC3}"/>
+              </a:ext>
+            </a:extLst>
+          </p:cNvPr>
+          <p:cNvSpPr>
+            <a:spLocks noGrp="1"/>
+          </p:cNvSpPr>
+          <p:nvPr>
+            <p:ph type="ftr" sz="quarter" idx="11"/>
+          </p:nvPr>
+        </p:nvSpPr>
+        <p:spPr/>
+        <p:txBody>
+          <a:bodyPr/>
+          <a:lstStyle/>
+          <a:p>
+            <a:r>
+              <a:rPr lang="en-US"/>
+              <a:t>Follow us on https://facebook.com/greenlearner</a:t>
             </a:r>
           </a:p>
         </p:txBody>
@@ -7322,6 +8182,34 @@
             <a:r>
               <a:rPr lang="en-IN" sz="2000" dirty="0"/>
               <a:t>High availability</a:t>
+            </a:r>
+          </a:p>
+        </p:txBody>
+      </p:sp>
+      <p:sp>
+        <p:nvSpPr>
+          <p:cNvPr id="4" name="Footer Placeholder 3">
+            <a:extLst>
+              <a:ext uri="{FF2B5EF4-FFF2-40B4-BE49-F238E27FC236}">
+                <a16:creationId xmlns:a16="http://schemas.microsoft.com/office/drawing/2014/main" id="{15E88E7F-F669-4344-A93A-19EBA7C9A450}"/>
+              </a:ext>
+            </a:extLst>
+          </p:cNvPr>
+          <p:cNvSpPr>
+            <a:spLocks noGrp="1"/>
+          </p:cNvSpPr>
+          <p:nvPr>
+            <p:ph type="ftr" sz="quarter" idx="11"/>
+          </p:nvPr>
+        </p:nvSpPr>
+        <p:spPr/>
+        <p:txBody>
+          <a:bodyPr/>
+          <a:lstStyle/>
+          <a:p>
+            <a:r>
+              <a:rPr lang="en-US"/>
+              <a:t>Follow us on https://facebook.com/greenlearner</a:t>
             </a:r>
           </a:p>
         </p:txBody>
@@ -9019,6 +9907,34 @@
           </a:fontRef>
         </p:style>
       </p:cxnSp>
+      <p:sp>
+        <p:nvSpPr>
+          <p:cNvPr id="26" name="Footer Placeholder 25">
+            <a:extLst>
+              <a:ext uri="{FF2B5EF4-FFF2-40B4-BE49-F238E27FC236}">
+                <a16:creationId xmlns:a16="http://schemas.microsoft.com/office/drawing/2014/main" id="{93B82A6B-6883-4348-ACF1-3BF2EA319B7C}"/>
+              </a:ext>
+            </a:extLst>
+          </p:cNvPr>
+          <p:cNvSpPr>
+            <a:spLocks noGrp="1"/>
+          </p:cNvSpPr>
+          <p:nvPr>
+            <p:ph type="ftr" sz="quarter" idx="11"/>
+          </p:nvPr>
+        </p:nvSpPr>
+        <p:spPr/>
+        <p:txBody>
+          <a:bodyPr/>
+          <a:lstStyle/>
+          <a:p>
+            <a:r>
+              <a:rPr lang="en-US"/>
+              <a:t>Follow us on https://facebook.com/greenlearner</a:t>
+            </a:r>
+          </a:p>
+        </p:txBody>
+      </p:sp>
     </p:spTree>
     <p:extLst>
       <p:ext uri="{BB962C8B-B14F-4D97-AF65-F5344CB8AC3E}">
@@ -9162,6 +10078,34 @@
           </a:extLst>
         </p:spPr>
       </p:pic>
+      <p:sp>
+        <p:nvSpPr>
+          <p:cNvPr id="4" name="Footer Placeholder 3">
+            <a:extLst>
+              <a:ext uri="{FF2B5EF4-FFF2-40B4-BE49-F238E27FC236}">
+                <a16:creationId xmlns:a16="http://schemas.microsoft.com/office/drawing/2014/main" id="{73478965-7247-4838-A1B1-DBC55A292AF0}"/>
+              </a:ext>
+            </a:extLst>
+          </p:cNvPr>
+          <p:cNvSpPr>
+            <a:spLocks noGrp="1"/>
+          </p:cNvSpPr>
+          <p:nvPr>
+            <p:ph type="ftr" sz="quarter" idx="11"/>
+          </p:nvPr>
+        </p:nvSpPr>
+        <p:spPr/>
+        <p:txBody>
+          <a:bodyPr/>
+          <a:lstStyle/>
+          <a:p>
+            <a:r>
+              <a:rPr lang="en-US"/>
+              <a:t>Follow us on https://facebook.com/greenlearner</a:t>
+            </a:r>
+          </a:p>
+        </p:txBody>
+      </p:sp>
     </p:spTree>
     <p:extLst>
       <p:ext uri="{BB962C8B-B14F-4D97-AF65-F5344CB8AC3E}">
@@ -9305,6 +10249,34 @@
           </a:extLst>
         </p:spPr>
       </p:pic>
+      <p:sp>
+        <p:nvSpPr>
+          <p:cNvPr id="3" name="Footer Placeholder 2">
+            <a:extLst>
+              <a:ext uri="{FF2B5EF4-FFF2-40B4-BE49-F238E27FC236}">
+                <a16:creationId xmlns:a16="http://schemas.microsoft.com/office/drawing/2014/main" id="{E37862A1-3CC1-46A5-A6BA-A16D6F4BAAC7}"/>
+              </a:ext>
+            </a:extLst>
+          </p:cNvPr>
+          <p:cNvSpPr>
+            <a:spLocks noGrp="1"/>
+          </p:cNvSpPr>
+          <p:nvPr>
+            <p:ph type="ftr" sz="quarter" idx="11"/>
+          </p:nvPr>
+        </p:nvSpPr>
+        <p:spPr/>
+        <p:txBody>
+          <a:bodyPr/>
+          <a:lstStyle/>
+          <a:p>
+            <a:r>
+              <a:rPr lang="en-US"/>
+              <a:t>Follow us on https://facebook.com/greenlearner</a:t>
+            </a:r>
+          </a:p>
+        </p:txBody>
+      </p:sp>
     </p:spTree>
     <p:extLst>
       <p:ext uri="{BB962C8B-B14F-4D97-AF65-F5344CB8AC3E}">
@@ -9448,6 +10420,34 @@
           </a:extLst>
         </p:spPr>
       </p:pic>
+      <p:sp>
+        <p:nvSpPr>
+          <p:cNvPr id="5" name="Footer Placeholder 4">
+            <a:extLst>
+              <a:ext uri="{FF2B5EF4-FFF2-40B4-BE49-F238E27FC236}">
+                <a16:creationId xmlns:a16="http://schemas.microsoft.com/office/drawing/2014/main" id="{E7F89615-7813-4B4B-B81D-1E8EE27D1597}"/>
+              </a:ext>
+            </a:extLst>
+          </p:cNvPr>
+          <p:cNvSpPr>
+            <a:spLocks noGrp="1"/>
+          </p:cNvSpPr>
+          <p:nvPr>
+            <p:ph type="ftr" sz="quarter" idx="11"/>
+          </p:nvPr>
+        </p:nvSpPr>
+        <p:spPr/>
+        <p:txBody>
+          <a:bodyPr/>
+          <a:lstStyle/>
+          <a:p>
+            <a:r>
+              <a:rPr lang="en-US"/>
+              <a:t>Follow us on https://facebook.com/greenlearner</a:t>
+            </a:r>
+          </a:p>
+        </p:txBody>
+      </p:sp>
     </p:spTree>
     <p:extLst>
       <p:ext uri="{BB962C8B-B14F-4D97-AF65-F5344CB8AC3E}">
@@ -9582,6 +10582,34 @@
             <a:r>
               <a:rPr lang="en-IN" sz="2000" dirty="0"/>
               <a:t>Optimal API for each client as per requirement</a:t>
+            </a:r>
+          </a:p>
+        </p:txBody>
+      </p:sp>
+      <p:sp>
+        <p:nvSpPr>
+          <p:cNvPr id="4" name="Footer Placeholder 3">
+            <a:extLst>
+              <a:ext uri="{FF2B5EF4-FFF2-40B4-BE49-F238E27FC236}">
+                <a16:creationId xmlns:a16="http://schemas.microsoft.com/office/drawing/2014/main" id="{FBF58C9E-FBFF-4818-8779-D97AFD3D6FDF}"/>
+              </a:ext>
+            </a:extLst>
+          </p:cNvPr>
+          <p:cNvSpPr>
+            <a:spLocks noGrp="1"/>
+          </p:cNvSpPr>
+          <p:nvPr>
+            <p:ph type="ftr" sz="quarter" idx="11"/>
+          </p:nvPr>
+        </p:nvSpPr>
+        <p:spPr/>
+        <p:txBody>
+          <a:bodyPr/>
+          <a:lstStyle/>
+          <a:p>
+            <a:r>
+              <a:rPr lang="en-US"/>
+              <a:t>Follow us on https://facebook.com/greenlearner</a:t>
             </a:r>
           </a:p>
         </p:txBody>
@@ -10473,4 +11501,342 @@
     </a:ext>
   </a:extLst>
 </a:theme>
+</file>
+
+<file path=ppt/theme/theme2.xml><?xml version="1.0" encoding="utf-8"?>
+<a:theme xmlns:a="http://schemas.openxmlformats.org/drawingml/2006/main" name="Office Theme">
+  <a:themeElements>
+    <a:clrScheme name="Office">
+      <a:dk1>
+        <a:sysClr val="windowText" lastClr="000000"/>
+      </a:dk1>
+      <a:lt1>
+        <a:sysClr val="window" lastClr="FFFFFF"/>
+      </a:lt1>
+      <a:dk2>
+        <a:srgbClr val="44546A"/>
+      </a:dk2>
+      <a:lt2>
+        <a:srgbClr val="E7E6E6"/>
+      </a:lt2>
+      <a:accent1>
+        <a:srgbClr val="4472C4"/>
+      </a:accent1>
+      <a:accent2>
+        <a:srgbClr val="ED7D31"/>
+      </a:accent2>
+      <a:accent3>
+        <a:srgbClr val="A5A5A5"/>
+      </a:accent3>
+      <a:accent4>
+        <a:srgbClr val="FFC000"/>
+      </a:accent4>
+      <a:accent5>
+        <a:srgbClr val="5B9BD5"/>
+      </a:accent5>
+      <a:accent6>
+        <a:srgbClr val="70AD47"/>
+      </a:accent6>
+      <a:hlink>
+        <a:srgbClr val="0563C1"/>
+      </a:hlink>
+      <a:folHlink>
+        <a:srgbClr val="954F72"/>
+      </a:folHlink>
+    </a:clrScheme>
+    <a:fontScheme name="Office">
+      <a:majorFont>
+        <a:latin typeface="Calibri Light" panose="020F0302020204030204"/>
+        <a:ea typeface=""/>
+        <a:cs typeface=""/>
+        <a:font script="Jpan" typeface="游ゴシック Light"/>
+        <a:font script="Hang" typeface="맑은 고딕"/>
+        <a:font script="Hans" typeface="等线 Light"/>
+        <a:font script="Hant" typeface="新細明體"/>
+        <a:font script="Arab" typeface="Times New Roman"/>
+        <a:font script="Hebr" typeface="Times New Roman"/>
+        <a:font script="Thai" typeface="Angsana New"/>
+        <a:font script="Ethi" typeface="Nyala"/>
+        <a:font script="Beng" typeface="Vrinda"/>
+        <a:font script="Gujr" typeface="Shruti"/>
+        <a:font script="Khmr" typeface="MoolBoran"/>
+        <a:font script="Knda" typeface="Tunga"/>
+        <a:font script="Guru" typeface="Raavi"/>
+        <a:font script="Cans" typeface="Euphemia"/>
+        <a:font script="Cher" typeface="Plantagenet Cherokee"/>
+        <a:font script="Yiii" typeface="Microsoft Yi Baiti"/>
+        <a:font script="Tibt" typeface="Microsoft Himalaya"/>
+        <a:font script="Thaa" typeface="MV Boli"/>
+        <a:font script="Deva" typeface="Mangal"/>
+        <a:font script="Telu" typeface="Gautami"/>
+        <a:font script="Taml" typeface="Latha"/>
+        <a:font script="Syrc" typeface="Estrangelo Edessa"/>
+        <a:font script="Orya" typeface="Kalinga"/>
+        <a:font script="Mlym" typeface="Kartika"/>
+        <a:font script="Laoo" typeface="DokChampa"/>
+        <a:font script="Sinh" typeface="Iskoola Pota"/>
+        <a:font script="Mong" typeface="Mongolian Baiti"/>
+        <a:font script="Viet" typeface="Times New Roman"/>
+        <a:font script="Uigh" typeface="Microsoft Uighur"/>
+        <a:font script="Geor" typeface="Sylfaen"/>
+        <a:font script="Armn" typeface="Arial"/>
+        <a:font script="Bugi" typeface="Leelawadee UI"/>
+        <a:font script="Bopo" typeface="Microsoft JhengHei"/>
+        <a:font script="Java" typeface="Javanese Text"/>
+        <a:font script="Lisu" typeface="Segoe UI"/>
+        <a:font script="Mymr" typeface="Myanmar Text"/>
+        <a:font script="Nkoo" typeface="Ebrima"/>
+        <a:font script="Olck" typeface="Nirmala UI"/>
+        <a:font script="Osma" typeface="Ebrima"/>
+        <a:font script="Phag" typeface="Phagspa"/>
+        <a:font script="Syrn" typeface="Estrangelo Edessa"/>
+        <a:font script="Syrj" typeface="Estrangelo Edessa"/>
+        <a:font script="Syre" typeface="Estrangelo Edessa"/>
+        <a:font script="Sora" typeface="Nirmala UI"/>
+        <a:font script="Tale" typeface="Microsoft Tai Le"/>
+        <a:font script="Talu" typeface="Microsoft New Tai Lue"/>
+        <a:font script="Tfng" typeface="Ebrima"/>
+      </a:majorFont>
+      <a:minorFont>
+        <a:latin typeface="Calibri" panose="020F0502020204030204"/>
+        <a:ea typeface=""/>
+        <a:cs typeface=""/>
+        <a:font script="Jpan" typeface="游ゴシック"/>
+        <a:font script="Hang" typeface="맑은 고딕"/>
+        <a:font script="Hans" typeface="等线"/>
+        <a:font script="Hant" typeface="新細明體"/>
+        <a:font script="Arab" typeface="Arial"/>
+        <a:font script="Hebr" typeface="Arial"/>
+        <a:font script="Thai" typeface="Cordia New"/>
+        <a:font script="Ethi" typeface="Nyala"/>
+        <a:font script="Beng" typeface="Vrinda"/>
+        <a:font script="Gujr" typeface="Shruti"/>
+        <a:font script="Khmr" typeface="DaunPenh"/>
+        <a:font script="Knda" typeface="Tunga"/>
+        <a:font script="Guru" typeface="Raavi"/>
+        <a:font script="Cans" typeface="Euphemia"/>
+        <a:font script="Cher" typeface="Plantagenet Cherokee"/>
+        <a:font script="Yiii" typeface="Microsoft Yi Baiti"/>
+        <a:font script="Tibt" typeface="Microsoft Himalaya"/>
+        <a:font script="Thaa" typeface="MV Boli"/>
+        <a:font script="Deva" typeface="Mangal"/>
+        <a:font script="Telu" typeface="Gautami"/>
+        <a:font script="Taml" typeface="Latha"/>
+        <a:font script="Syrc" typeface="Estrangelo Edessa"/>
+        <a:font script="Orya" typeface="Kalinga"/>
+        <a:font script="Mlym" typeface="Kartika"/>
+        <a:font script="Laoo" typeface="DokChampa"/>
+        <a:font script="Sinh" typeface="Iskoola Pota"/>
+        <a:font script="Mong" typeface="Mongolian Baiti"/>
+        <a:font script="Viet" typeface="Arial"/>
+        <a:font script="Uigh" typeface="Microsoft Uighur"/>
+        <a:font script="Geor" typeface="Sylfaen"/>
+        <a:font script="Armn" typeface="Arial"/>
+        <a:font script="Bugi" typeface="Leelawadee UI"/>
+        <a:font script="Bopo" typeface="Microsoft JhengHei"/>
+        <a:font script="Java" typeface="Javanese Text"/>
+        <a:font script="Lisu" typeface="Segoe UI"/>
+        <a:font script="Mymr" typeface="Myanmar Text"/>
+        <a:font script="Nkoo" typeface="Ebrima"/>
+        <a:font script="Olck" typeface="Nirmala UI"/>
+        <a:font script="Osma" typeface="Ebrima"/>
+        <a:font script="Phag" typeface="Phagspa"/>
+        <a:font script="Syrn" typeface="Estrangelo Edessa"/>
+        <a:font script="Syrj" typeface="Estrangelo Edessa"/>
+        <a:font script="Syre" typeface="Estrangelo Edessa"/>
+        <a:font script="Sora" typeface="Nirmala UI"/>
+        <a:font script="Tale" typeface="Microsoft Tai Le"/>
+        <a:font script="Talu" typeface="Microsoft New Tai Lue"/>
+        <a:font script="Tfng" typeface="Ebrima"/>
+      </a:minorFont>
+    </a:fontScheme>
+    <a:fmtScheme name="Office">
+      <a:fillStyleLst>
+        <a:solidFill>
+          <a:schemeClr val="phClr"/>
+        </a:solidFill>
+        <a:gradFill rotWithShape="1">
+          <a:gsLst>
+            <a:gs pos="0">
+              <a:schemeClr val="phClr">
+                <a:lumMod val="110000"/>
+                <a:satMod val="105000"/>
+                <a:tint val="67000"/>
+              </a:schemeClr>
+            </a:gs>
+            <a:gs pos="50000">
+              <a:schemeClr val="phClr">
+                <a:lumMod val="105000"/>
+                <a:satMod val="103000"/>
+                <a:tint val="73000"/>
+              </a:schemeClr>
+            </a:gs>
+            <a:gs pos="100000">
+              <a:schemeClr val="phClr">
+                <a:lumMod val="105000"/>
+                <a:satMod val="109000"/>
+                <a:tint val="81000"/>
+              </a:schemeClr>
+            </a:gs>
+          </a:gsLst>
+          <a:lin ang="5400000" scaled="0"/>
+        </a:gradFill>
+        <a:gradFill rotWithShape="1">
+          <a:gsLst>
+            <a:gs pos="0">
+              <a:schemeClr val="phClr">
+                <a:satMod val="103000"/>
+                <a:lumMod val="102000"/>
+                <a:tint val="94000"/>
+              </a:schemeClr>
+            </a:gs>
+            <a:gs pos="50000">
+              <a:schemeClr val="phClr">
+                <a:satMod val="110000"/>
+                <a:lumMod val="100000"/>
+                <a:shade val="100000"/>
+              </a:schemeClr>
+            </a:gs>
+            <a:gs pos="100000">
+              <a:schemeClr val="phClr">
+                <a:lumMod val="99000"/>
+                <a:satMod val="120000"/>
+                <a:shade val="78000"/>
+              </a:schemeClr>
+            </a:gs>
+          </a:gsLst>
+          <a:lin ang="5400000" scaled="0"/>
+        </a:gradFill>
+      </a:fillStyleLst>
+      <a:lnStyleLst>
+        <a:ln w="6350" cap="flat" cmpd="sng" algn="ctr">
+          <a:solidFill>
+            <a:schemeClr val="phClr"/>
+          </a:solidFill>
+          <a:prstDash val="solid"/>
+          <a:miter lim="800000"/>
+        </a:ln>
+        <a:ln w="12700" cap="flat" cmpd="sng" algn="ctr">
+          <a:solidFill>
+            <a:schemeClr val="phClr"/>
+          </a:solidFill>
+          <a:prstDash val="solid"/>
+          <a:miter lim="800000"/>
+        </a:ln>
+        <a:ln w="19050" cap="flat" cmpd="sng" algn="ctr">
+          <a:solidFill>
+            <a:schemeClr val="phClr"/>
+          </a:solidFill>
+          <a:prstDash val="solid"/>
+          <a:miter lim="800000"/>
+        </a:ln>
+      </a:lnStyleLst>
+      <a:effectStyleLst>
+        <a:effectStyle>
+          <a:effectLst/>
+        </a:effectStyle>
+        <a:effectStyle>
+          <a:effectLst/>
+        </a:effectStyle>
+        <a:effectStyle>
+          <a:effectLst>
+            <a:outerShdw blurRad="57150" dist="19050" dir="5400000" algn="ctr" rotWithShape="0">
+              <a:srgbClr val="000000">
+                <a:alpha val="63000"/>
+              </a:srgbClr>
+            </a:outerShdw>
+          </a:effectLst>
+        </a:effectStyle>
+      </a:effectStyleLst>
+      <a:bgFillStyleLst>
+        <a:solidFill>
+          <a:schemeClr val="phClr"/>
+        </a:solidFill>
+        <a:solidFill>
+          <a:schemeClr val="phClr">
+            <a:tint val="95000"/>
+            <a:satMod val="170000"/>
+          </a:schemeClr>
+        </a:solidFill>
+        <a:gradFill rotWithShape="1">
+          <a:gsLst>
+            <a:gs pos="0">
+              <a:schemeClr val="phClr">
+                <a:tint val="93000"/>
+                <a:satMod val="150000"/>
+                <a:shade val="98000"/>
+                <a:lumMod val="102000"/>
+              </a:schemeClr>
+            </a:gs>
+            <a:gs pos="50000">
+              <a:schemeClr val="phClr">
+                <a:tint val="98000"/>
+                <a:satMod val="130000"/>
+                <a:shade val="90000"/>
+                <a:lumMod val="103000"/>
+              </a:schemeClr>
+            </a:gs>
+            <a:gs pos="100000">
+              <a:schemeClr val="phClr">
+                <a:shade val="63000"/>
+                <a:satMod val="120000"/>
+              </a:schemeClr>
+            </a:gs>
+          </a:gsLst>
+          <a:lin ang="5400000" scaled="0"/>
+        </a:gradFill>
+      </a:bgFillStyleLst>
+    </a:fmtScheme>
+  </a:themeElements>
+  <a:objectDefaults/>
+  <a:extraClrSchemeLst/>
+  <a:extLst>
+    <a:ext uri="{05A4C25C-085E-4340-85A3-A5531E510DB2}">
+      <thm15:themeFamily xmlns:thm15="http://schemas.microsoft.com/office/thememl/2012/main" name="Office Theme" id="{62F939B6-93AF-4DB8-9C6B-D6C7DFDC589F}" vid="{4A3C46E8-61CC-4603-A589-7422A47A8E4A}"/>
+    </a:ext>
+  </a:extLst>
+</a:theme>
+</file>
+
+<file path=ppt/theme/themeOverride1.xml><?xml version="1.0" encoding="utf-8"?>
+<a:themeOverride xmlns:a="http://schemas.openxmlformats.org/drawingml/2006/main">
+  <a:clrScheme name="AnalogousFromDarkSeedLeftStep">
+    <a:dk1>
+      <a:srgbClr val="000000"/>
+    </a:dk1>
+    <a:lt1>
+      <a:srgbClr val="FFFFFF"/>
+    </a:lt1>
+    <a:dk2>
+      <a:srgbClr val="412434"/>
+    </a:dk2>
+    <a:lt2>
+      <a:srgbClr val="E2E8E7"/>
+    </a:lt2>
+    <a:accent1>
+      <a:srgbClr val="C34D5F"/>
+    </a:accent1>
+    <a:accent2>
+      <a:srgbClr val="B13B7E"/>
+    </a:accent2>
+    <a:accent3>
+      <a:srgbClr val="C34DC2"/>
+    </a:accent3>
+    <a:accent4>
+      <a:srgbClr val="813BB1"/>
+    </a:accent4>
+    <a:accent5>
+      <a:srgbClr val="624DC3"/>
+    </a:accent5>
+    <a:accent6>
+      <a:srgbClr val="3B57B1"/>
+    </a:accent6>
+    <a:hlink>
+      <a:srgbClr val="8763CB"/>
+    </a:hlink>
+    <a:folHlink>
+      <a:srgbClr val="7F7F7F"/>
+    </a:folHlink>
+  </a:clrScheme>
+</a:themeOverride>
 </file>
</xml_diff>

<commit_message>
adding management endpoins for monitoring
</commit_message>
<xml_diff>
--- a/API GATEWAY.pptx
+++ b/API GATEWAY.pptx
@@ -5,7 +5,7 @@
     <p:sldMasterId id="2147483660" r:id="rId1"/>
   </p:sldMasterIdLst>
   <p:notesMasterIdLst>
-    <p:notesMasterId r:id="rId29"/>
+    <p:notesMasterId r:id="rId31"/>
   </p:notesMasterIdLst>
   <p:sldIdLst>
     <p:sldId id="256" r:id="rId2"/>
@@ -30,11 +30,13 @@
     <p:sldId id="273" r:id="rId21"/>
     <p:sldId id="284" r:id="rId22"/>
     <p:sldId id="278" r:id="rId23"/>
-    <p:sldId id="274" r:id="rId24"/>
-    <p:sldId id="279" r:id="rId25"/>
-    <p:sldId id="275" r:id="rId26"/>
-    <p:sldId id="271" r:id="rId27"/>
-    <p:sldId id="269" r:id="rId28"/>
+    <p:sldId id="286" r:id="rId24"/>
+    <p:sldId id="285" r:id="rId25"/>
+    <p:sldId id="274" r:id="rId26"/>
+    <p:sldId id="279" r:id="rId27"/>
+    <p:sldId id="275" r:id="rId28"/>
+    <p:sldId id="271" r:id="rId29"/>
+    <p:sldId id="269" r:id="rId30"/>
   </p:sldIdLst>
   <p:sldSz cx="12192000" cy="6858000"/>
   <p:notesSz cx="6858000" cy="9144000"/>
@@ -10389,7 +10391,7 @@
               <a:t>Zuul</a:t>
             </a:r>
             <a:br>
-              <a:rPr lang="en-IN" sz="8000" b="1">
+              <a:rPr lang="en-IN" sz="8000" b="1" dirty="0">
                 <a:solidFill>
                   <a:srgbClr val="FF0000"/>
                 </a:solidFill>
@@ -10397,7 +10399,7 @@
               </a:rPr>
             </a:br>
             <a:r>
-              <a:rPr lang="en-IN" sz="9600" b="1">
+              <a:rPr lang="en-IN" sz="9600" b="1" dirty="0">
                 <a:solidFill>
                   <a:srgbClr val="7030A0"/>
                 </a:solidFill>
@@ -12300,15 +12302,41 @@
               </a:rPr>
             </a:br>
             <a:r>
-              <a:rPr lang="en-IN" sz="8900" b="1" dirty="0">
+              <a:rPr lang="en-IN" sz="3600" b="1" dirty="0">
                 <a:solidFill>
-                  <a:srgbClr val="7030A0"/>
+                  <a:srgbClr val="00B0F0"/>
                 </a:solidFill>
                 <a:latin typeface="Algerian" panose="04020705040A02060702" pitchFamily="82" charset="0"/>
               </a:rPr>
-              <a:t>LOGGING/AUDITING</a:t>
-            </a:r>
-            <a:endParaRPr lang="en-IN" sz="13800" b="1" dirty="0">
+              <a:t>actuator endpoints</a:t>
+            </a:r>
+            <a:br>
+              <a:rPr lang="en-IN" sz="3600" b="1" dirty="0">
+                <a:solidFill>
+                  <a:srgbClr val="00B0F0"/>
+                </a:solidFill>
+                <a:latin typeface="Algerian" panose="04020705040A02060702" pitchFamily="82" charset="0"/>
+              </a:rPr>
+            </a:br>
+            <a:r>
+              <a:rPr lang="en-IN" sz="4900" b="1" dirty="0">
+                <a:solidFill>
+                  <a:srgbClr val="002060"/>
+                </a:solidFill>
+                <a:latin typeface="Algerian" panose="04020705040A02060702" pitchFamily="82" charset="0"/>
+              </a:rPr>
+              <a:t>API </a:t>
+            </a:r>
+            <a:r>
+              <a:rPr lang="en-IN" sz="5300" b="1" dirty="0">
+                <a:solidFill>
+                  <a:srgbClr val="002060"/>
+                </a:solidFill>
+                <a:latin typeface="Algerian" panose="04020705040A02060702" pitchFamily="82" charset="0"/>
+              </a:rPr>
+              <a:t>Gateway Monitoring</a:t>
+            </a:r>
+            <a:endParaRPr lang="en-IN" sz="8800" b="1" dirty="0">
               <a:solidFill>
                 <a:srgbClr val="002060"/>
               </a:solidFill>
@@ -12442,7 +12470,7 @@
     </p:spTree>
     <p:extLst>
       <p:ext uri="{BB962C8B-B14F-4D97-AF65-F5344CB8AC3E}">
-        <p14:creationId xmlns:p14="http://schemas.microsoft.com/office/powerpoint/2010/main" val="2991444212"/>
+        <p14:creationId xmlns:p14="http://schemas.microsoft.com/office/powerpoint/2010/main" val="292754595"/>
       </p:ext>
     </p:extLst>
   </p:cSld>
@@ -12516,677 +12544,12 @@
           <a:lstStyle/>
           <a:p>
             <a:r>
-              <a:rPr lang="en-IN" dirty="0"/>
-              <a:t>Solution – API gateway</a:t>
+              <a:rPr lang="en-IN" i="0" dirty="0"/>
+              <a:t>Management Endpoints</a:t>
             </a:r>
           </a:p>
         </p:txBody>
       </p:sp>
-      <p:sp>
-        <p:nvSpPr>
-          <p:cNvPr id="4" name="Rectangle 3">
-            <a:extLst>
-              <a:ext uri="{FF2B5EF4-FFF2-40B4-BE49-F238E27FC236}">
-                <a16:creationId xmlns:a16="http://schemas.microsoft.com/office/drawing/2014/main" id="{42D1BCDD-0A79-4751-9426-B30935BEECB2}"/>
-              </a:ext>
-            </a:extLst>
-          </p:cNvPr>
-          <p:cNvSpPr/>
-          <p:nvPr/>
-        </p:nvSpPr>
-        <p:spPr>
-          <a:xfrm>
-            <a:off x="416378" y="3429000"/>
-            <a:ext cx="1495425" cy="962025"/>
-          </a:xfrm>
-          <a:prstGeom prst="rect">
-            <a:avLst/>
-          </a:prstGeom>
-        </p:spPr>
-        <p:style>
-          <a:lnRef idx="2">
-            <a:schemeClr val="accent1">
-              <a:shade val="50000"/>
-            </a:schemeClr>
-          </a:lnRef>
-          <a:fillRef idx="1">
-            <a:schemeClr val="accent1"/>
-          </a:fillRef>
-          <a:effectRef idx="0">
-            <a:schemeClr val="accent1"/>
-          </a:effectRef>
-          <a:fontRef idx="minor">
-            <a:schemeClr val="lt1"/>
-          </a:fontRef>
-        </p:style>
-        <p:txBody>
-          <a:bodyPr rtlCol="0" anchor="ctr"/>
-          <a:lstStyle/>
-          <a:p>
-            <a:pPr algn="ctr"/>
-            <a:r>
-              <a:rPr lang="en-IN" dirty="0"/>
-              <a:t>Front End- Dashboard</a:t>
-            </a:r>
-          </a:p>
-        </p:txBody>
-      </p:sp>
-      <p:sp>
-        <p:nvSpPr>
-          <p:cNvPr id="5" name="Rectangle 4">
-            <a:extLst>
-              <a:ext uri="{FF2B5EF4-FFF2-40B4-BE49-F238E27FC236}">
-                <a16:creationId xmlns:a16="http://schemas.microsoft.com/office/drawing/2014/main" id="{9599D53A-1255-459E-8252-E027A125760E}"/>
-              </a:ext>
-            </a:extLst>
-          </p:cNvPr>
-          <p:cNvSpPr/>
-          <p:nvPr/>
-        </p:nvSpPr>
-        <p:spPr>
-          <a:xfrm>
-            <a:off x="7659461" y="2014194"/>
-            <a:ext cx="1343025" cy="962025"/>
-          </a:xfrm>
-          <a:prstGeom prst="rect">
-            <a:avLst/>
-          </a:prstGeom>
-        </p:spPr>
-        <p:style>
-          <a:lnRef idx="2">
-            <a:schemeClr val="accent1">
-              <a:shade val="50000"/>
-            </a:schemeClr>
-          </a:lnRef>
-          <a:fillRef idx="1">
-            <a:schemeClr val="accent1"/>
-          </a:fillRef>
-          <a:effectRef idx="0">
-            <a:schemeClr val="accent1"/>
-          </a:effectRef>
-          <a:fontRef idx="minor">
-            <a:schemeClr val="lt1"/>
-          </a:fontRef>
-        </p:style>
-        <p:txBody>
-          <a:bodyPr rtlCol="0" anchor="ctr"/>
-          <a:lstStyle/>
-          <a:p>
-            <a:pPr algn="ctr"/>
-            <a:r>
-              <a:rPr lang="en-IN" dirty="0"/>
-              <a:t>Doctor’s details</a:t>
-            </a:r>
-          </a:p>
-        </p:txBody>
-      </p:sp>
-      <p:sp>
-        <p:nvSpPr>
-          <p:cNvPr id="6" name="Rectangle 5">
-            <a:extLst>
-              <a:ext uri="{FF2B5EF4-FFF2-40B4-BE49-F238E27FC236}">
-                <a16:creationId xmlns:a16="http://schemas.microsoft.com/office/drawing/2014/main" id="{BEDB7F33-BD99-4854-BB7E-AB8C3DABA793}"/>
-              </a:ext>
-            </a:extLst>
-          </p:cNvPr>
-          <p:cNvSpPr/>
-          <p:nvPr/>
-        </p:nvSpPr>
-        <p:spPr>
-          <a:xfrm>
-            <a:off x="7659461" y="3429000"/>
-            <a:ext cx="1343025" cy="962025"/>
-          </a:xfrm>
-          <a:prstGeom prst="rect">
-            <a:avLst/>
-          </a:prstGeom>
-        </p:spPr>
-        <p:style>
-          <a:lnRef idx="2">
-            <a:schemeClr val="accent1">
-              <a:shade val="50000"/>
-            </a:schemeClr>
-          </a:lnRef>
-          <a:fillRef idx="1">
-            <a:schemeClr val="accent1"/>
-          </a:fillRef>
-          <a:effectRef idx="0">
-            <a:schemeClr val="accent1"/>
-          </a:effectRef>
-          <a:fontRef idx="minor">
-            <a:schemeClr val="lt1"/>
-          </a:fontRef>
-        </p:style>
-        <p:txBody>
-          <a:bodyPr rtlCol="0" anchor="ctr"/>
-          <a:lstStyle/>
-          <a:p>
-            <a:pPr algn="ctr"/>
-            <a:r>
-              <a:rPr lang="en-IN" dirty="0"/>
-              <a:t>Patient details</a:t>
-            </a:r>
-          </a:p>
-        </p:txBody>
-      </p:sp>
-      <p:sp>
-        <p:nvSpPr>
-          <p:cNvPr id="7" name="Rectangle 6">
-            <a:extLst>
-              <a:ext uri="{FF2B5EF4-FFF2-40B4-BE49-F238E27FC236}">
-                <a16:creationId xmlns:a16="http://schemas.microsoft.com/office/drawing/2014/main" id="{ABF2D441-45D6-4CF7-9092-B3B87635C2A8}"/>
-              </a:ext>
-            </a:extLst>
-          </p:cNvPr>
-          <p:cNvSpPr/>
-          <p:nvPr/>
-        </p:nvSpPr>
-        <p:spPr>
-          <a:xfrm>
-            <a:off x="7659461" y="4893473"/>
-            <a:ext cx="1343025" cy="962025"/>
-          </a:xfrm>
-          <a:prstGeom prst="rect">
-            <a:avLst/>
-          </a:prstGeom>
-        </p:spPr>
-        <p:style>
-          <a:lnRef idx="2">
-            <a:schemeClr val="accent1">
-              <a:shade val="50000"/>
-            </a:schemeClr>
-          </a:lnRef>
-          <a:fillRef idx="1">
-            <a:schemeClr val="accent1"/>
-          </a:fillRef>
-          <a:effectRef idx="0">
-            <a:schemeClr val="accent1"/>
-          </a:effectRef>
-          <a:fontRef idx="minor">
-            <a:schemeClr val="lt1"/>
-          </a:fontRef>
-        </p:style>
-        <p:txBody>
-          <a:bodyPr rtlCol="0" anchor="ctr"/>
-          <a:lstStyle/>
-          <a:p>
-            <a:pPr algn="ctr"/>
-            <a:r>
-              <a:rPr lang="en-IN" dirty="0"/>
-              <a:t>Medicine details</a:t>
-            </a:r>
-          </a:p>
-        </p:txBody>
-      </p:sp>
-      <p:sp>
-        <p:nvSpPr>
-          <p:cNvPr id="8" name="Rectangle 7">
-            <a:extLst>
-              <a:ext uri="{FF2B5EF4-FFF2-40B4-BE49-F238E27FC236}">
-                <a16:creationId xmlns:a16="http://schemas.microsoft.com/office/drawing/2014/main" id="{747949E8-69F7-4ACE-9B00-8DA77B33BF5D}"/>
-              </a:ext>
-            </a:extLst>
-          </p:cNvPr>
-          <p:cNvSpPr/>
-          <p:nvPr/>
-        </p:nvSpPr>
-        <p:spPr>
-          <a:xfrm>
-            <a:off x="9782175" y="3910012"/>
-            <a:ext cx="1343025" cy="962025"/>
-          </a:xfrm>
-          <a:prstGeom prst="rect">
-            <a:avLst/>
-          </a:prstGeom>
-        </p:spPr>
-        <p:style>
-          <a:lnRef idx="2">
-            <a:schemeClr val="accent1">
-              <a:shade val="50000"/>
-            </a:schemeClr>
-          </a:lnRef>
-          <a:fillRef idx="1">
-            <a:schemeClr val="accent1"/>
-          </a:fillRef>
-          <a:effectRef idx="0">
-            <a:schemeClr val="accent1"/>
-          </a:effectRef>
-          <a:fontRef idx="minor">
-            <a:schemeClr val="lt1"/>
-          </a:fontRef>
-        </p:style>
-        <p:txBody>
-          <a:bodyPr rtlCol="0" anchor="ctr"/>
-          <a:lstStyle/>
-          <a:p>
-            <a:pPr algn="ctr"/>
-            <a:r>
-              <a:rPr lang="en-IN" dirty="0"/>
-              <a:t>Location details</a:t>
-            </a:r>
-          </a:p>
-        </p:txBody>
-      </p:sp>
-      <p:sp>
-        <p:nvSpPr>
-          <p:cNvPr id="9" name="Rectangle 8">
-            <a:extLst>
-              <a:ext uri="{FF2B5EF4-FFF2-40B4-BE49-F238E27FC236}">
-                <a16:creationId xmlns:a16="http://schemas.microsoft.com/office/drawing/2014/main" id="{88E345F7-CEA1-4853-AAC9-8C7E05A64159}"/>
-              </a:ext>
-            </a:extLst>
-          </p:cNvPr>
-          <p:cNvSpPr/>
-          <p:nvPr/>
-        </p:nvSpPr>
-        <p:spPr>
-          <a:xfrm>
-            <a:off x="9782175" y="2240584"/>
-            <a:ext cx="1343025" cy="962025"/>
-          </a:xfrm>
-          <a:prstGeom prst="rect">
-            <a:avLst/>
-          </a:prstGeom>
-        </p:spPr>
-        <p:style>
-          <a:lnRef idx="2">
-            <a:schemeClr val="accent1">
-              <a:shade val="50000"/>
-            </a:schemeClr>
-          </a:lnRef>
-          <a:fillRef idx="1">
-            <a:schemeClr val="accent1"/>
-          </a:fillRef>
-          <a:effectRef idx="0">
-            <a:schemeClr val="accent1"/>
-          </a:effectRef>
-          <a:fontRef idx="minor">
-            <a:schemeClr val="lt1"/>
-          </a:fontRef>
-        </p:style>
-        <p:txBody>
-          <a:bodyPr rtlCol="0" anchor="ctr"/>
-          <a:lstStyle/>
-          <a:p>
-            <a:pPr algn="ctr"/>
-            <a:r>
-              <a:rPr lang="en-IN" dirty="0"/>
-              <a:t>Disease details</a:t>
-            </a:r>
-          </a:p>
-        </p:txBody>
-      </p:sp>
-      <p:sp>
-        <p:nvSpPr>
-          <p:cNvPr id="3" name="Rectangle: Rounded Corners 2">
-            <a:extLst>
-              <a:ext uri="{FF2B5EF4-FFF2-40B4-BE49-F238E27FC236}">
-                <a16:creationId xmlns:a16="http://schemas.microsoft.com/office/drawing/2014/main" id="{0241E15A-0801-479B-BEB5-964D1994DECD}"/>
-              </a:ext>
-            </a:extLst>
-          </p:cNvPr>
-          <p:cNvSpPr/>
-          <p:nvPr/>
-        </p:nvSpPr>
-        <p:spPr>
-          <a:xfrm>
-            <a:off x="4332514" y="2014194"/>
-            <a:ext cx="1495425" cy="4386606"/>
-          </a:xfrm>
-          <a:prstGeom prst="roundRect">
-            <a:avLst/>
-          </a:prstGeom>
-          <a:solidFill>
-            <a:srgbClr val="92D050"/>
-          </a:solidFill>
-          <a:ln>
-            <a:solidFill>
-              <a:srgbClr val="92D050"/>
-            </a:solidFill>
-          </a:ln>
-        </p:spPr>
-        <p:style>
-          <a:lnRef idx="2">
-            <a:schemeClr val="accent1">
-              <a:shade val="50000"/>
-            </a:schemeClr>
-          </a:lnRef>
-          <a:fillRef idx="1">
-            <a:schemeClr val="accent1"/>
-          </a:fillRef>
-          <a:effectRef idx="0">
-            <a:schemeClr val="accent1"/>
-          </a:effectRef>
-          <a:fontRef idx="minor">
-            <a:schemeClr val="lt1"/>
-          </a:fontRef>
-        </p:style>
-        <p:txBody>
-          <a:bodyPr rtlCol="0" anchor="ctr"/>
-          <a:lstStyle/>
-          <a:p>
-            <a:pPr algn="ctr"/>
-            <a:r>
-              <a:rPr lang="en-IN" sz="2800" b="1" dirty="0"/>
-              <a:t>A</a:t>
-            </a:r>
-          </a:p>
-          <a:p>
-            <a:pPr algn="ctr"/>
-            <a:r>
-              <a:rPr lang="en-IN" sz="2800" b="1" dirty="0"/>
-              <a:t>P</a:t>
-            </a:r>
-          </a:p>
-          <a:p>
-            <a:pPr algn="ctr"/>
-            <a:r>
-              <a:rPr lang="en-IN" sz="2800" b="1" dirty="0"/>
-              <a:t>I</a:t>
-            </a:r>
-          </a:p>
-          <a:p>
-            <a:pPr algn="ctr"/>
-            <a:r>
-              <a:rPr lang="en-IN" sz="2800" b="1" dirty="0"/>
-              <a:t>G</a:t>
-            </a:r>
-          </a:p>
-          <a:p>
-            <a:pPr algn="ctr"/>
-            <a:r>
-              <a:rPr lang="en-IN" sz="2800" b="1" dirty="0"/>
-              <a:t>A</a:t>
-            </a:r>
-          </a:p>
-          <a:p>
-            <a:pPr algn="ctr"/>
-            <a:r>
-              <a:rPr lang="en-IN" sz="2800" b="1" dirty="0"/>
-              <a:t>T</a:t>
-            </a:r>
-          </a:p>
-          <a:p>
-            <a:pPr algn="ctr"/>
-            <a:r>
-              <a:rPr lang="en-IN" sz="2800" b="1" dirty="0"/>
-              <a:t>E</a:t>
-            </a:r>
-          </a:p>
-          <a:p>
-            <a:pPr algn="ctr"/>
-            <a:r>
-              <a:rPr lang="en-IN" sz="2800" b="1" dirty="0"/>
-              <a:t>W</a:t>
-            </a:r>
-          </a:p>
-          <a:p>
-            <a:pPr algn="ctr"/>
-            <a:r>
-              <a:rPr lang="en-IN" sz="2800" b="1" dirty="0"/>
-              <a:t>A</a:t>
-            </a:r>
-          </a:p>
-          <a:p>
-            <a:pPr algn="ctr"/>
-            <a:r>
-              <a:rPr lang="en-IN" sz="2800" b="1" dirty="0"/>
-              <a:t>Y</a:t>
-            </a:r>
-          </a:p>
-        </p:txBody>
-      </p:sp>
-      <p:cxnSp>
-        <p:nvCxnSpPr>
-          <p:cNvPr id="11" name="Straight Arrow Connector 10">
-            <a:extLst>
-              <a:ext uri="{FF2B5EF4-FFF2-40B4-BE49-F238E27FC236}">
-                <a16:creationId xmlns:a16="http://schemas.microsoft.com/office/drawing/2014/main" id="{A874A2A6-CCF9-4AD8-8FC0-B159E27A45DE}"/>
-              </a:ext>
-            </a:extLst>
-          </p:cNvPr>
-          <p:cNvCxnSpPr>
-            <a:endCxn id="5" idx="1"/>
-          </p:cNvCxnSpPr>
-          <p:nvPr/>
-        </p:nvCxnSpPr>
-        <p:spPr>
-          <a:xfrm flipV="1">
-            <a:off x="5827939" y="2495207"/>
-            <a:ext cx="1831522" cy="481012"/>
-          </a:xfrm>
-          <a:prstGeom prst="straightConnector1">
-            <a:avLst/>
-          </a:prstGeom>
-          <a:ln>
-            <a:headEnd type="triangle"/>
-            <a:tailEnd type="triangle"/>
-          </a:ln>
-        </p:spPr>
-        <p:style>
-          <a:lnRef idx="3">
-            <a:schemeClr val="accent6"/>
-          </a:lnRef>
-          <a:fillRef idx="0">
-            <a:schemeClr val="accent6"/>
-          </a:fillRef>
-          <a:effectRef idx="2">
-            <a:schemeClr val="accent6"/>
-          </a:effectRef>
-          <a:fontRef idx="minor">
-            <a:schemeClr val="tx1"/>
-          </a:fontRef>
-        </p:style>
-      </p:cxnSp>
-      <p:cxnSp>
-        <p:nvCxnSpPr>
-          <p:cNvPr id="17" name="Straight Arrow Connector 16">
-            <a:extLst>
-              <a:ext uri="{FF2B5EF4-FFF2-40B4-BE49-F238E27FC236}">
-                <a16:creationId xmlns:a16="http://schemas.microsoft.com/office/drawing/2014/main" id="{698E21F8-F40C-4890-B8F6-538FA2D9BA16}"/>
-              </a:ext>
-            </a:extLst>
-          </p:cNvPr>
-          <p:cNvCxnSpPr>
-            <a:cxnSpLocks/>
-            <a:endCxn id="8" idx="1"/>
-          </p:cNvCxnSpPr>
-          <p:nvPr/>
-        </p:nvCxnSpPr>
-        <p:spPr>
-          <a:xfrm flipV="1">
-            <a:off x="5827939" y="4391025"/>
-            <a:ext cx="3954236" cy="759624"/>
-          </a:xfrm>
-          <a:prstGeom prst="straightConnector1">
-            <a:avLst/>
-          </a:prstGeom>
-          <a:ln>
-            <a:headEnd type="triangle"/>
-            <a:tailEnd type="triangle"/>
-          </a:ln>
-        </p:spPr>
-        <p:style>
-          <a:lnRef idx="3">
-            <a:schemeClr val="accent6"/>
-          </a:lnRef>
-          <a:fillRef idx="0">
-            <a:schemeClr val="accent6"/>
-          </a:fillRef>
-          <a:effectRef idx="2">
-            <a:schemeClr val="accent6"/>
-          </a:effectRef>
-          <a:fontRef idx="minor">
-            <a:schemeClr val="tx1"/>
-          </a:fontRef>
-        </p:style>
-      </p:cxnSp>
-      <p:cxnSp>
-        <p:nvCxnSpPr>
-          <p:cNvPr id="18" name="Straight Arrow Connector 17">
-            <a:extLst>
-              <a:ext uri="{FF2B5EF4-FFF2-40B4-BE49-F238E27FC236}">
-                <a16:creationId xmlns:a16="http://schemas.microsoft.com/office/drawing/2014/main" id="{C25130A0-9886-4F66-AD0D-8A1FEF7AC190}"/>
-              </a:ext>
-            </a:extLst>
-          </p:cNvPr>
-          <p:cNvCxnSpPr/>
-          <p:nvPr/>
-        </p:nvCxnSpPr>
-        <p:spPr>
-          <a:xfrm flipV="1">
-            <a:off x="5827939" y="3779048"/>
-            <a:ext cx="1831522" cy="481012"/>
-          </a:xfrm>
-          <a:prstGeom prst="straightConnector1">
-            <a:avLst/>
-          </a:prstGeom>
-          <a:ln>
-            <a:headEnd type="triangle"/>
-            <a:tailEnd type="triangle"/>
-          </a:ln>
-        </p:spPr>
-        <p:style>
-          <a:lnRef idx="3">
-            <a:schemeClr val="accent6"/>
-          </a:lnRef>
-          <a:fillRef idx="0">
-            <a:schemeClr val="accent6"/>
-          </a:fillRef>
-          <a:effectRef idx="2">
-            <a:schemeClr val="accent6"/>
-          </a:effectRef>
-          <a:fontRef idx="minor">
-            <a:schemeClr val="tx1"/>
-          </a:fontRef>
-        </p:style>
-      </p:cxnSp>
-      <p:cxnSp>
-        <p:nvCxnSpPr>
-          <p:cNvPr id="19" name="Straight Arrow Connector 18">
-            <a:extLst>
-              <a:ext uri="{FF2B5EF4-FFF2-40B4-BE49-F238E27FC236}">
-                <a16:creationId xmlns:a16="http://schemas.microsoft.com/office/drawing/2014/main" id="{BD6B7F29-E646-4194-8E84-2CB96AEC6B22}"/>
-              </a:ext>
-            </a:extLst>
-          </p:cNvPr>
-          <p:cNvCxnSpPr>
-            <a:cxnSpLocks/>
-          </p:cNvCxnSpPr>
-          <p:nvPr/>
-        </p:nvCxnSpPr>
-        <p:spPr>
-          <a:xfrm flipV="1">
-            <a:off x="5827939" y="2811913"/>
-            <a:ext cx="3954236" cy="967135"/>
-          </a:xfrm>
-          <a:prstGeom prst="straightConnector1">
-            <a:avLst/>
-          </a:prstGeom>
-          <a:ln>
-            <a:headEnd type="triangle"/>
-            <a:tailEnd type="triangle"/>
-          </a:ln>
-        </p:spPr>
-        <p:style>
-          <a:lnRef idx="3">
-            <a:schemeClr val="accent6"/>
-          </a:lnRef>
-          <a:fillRef idx="0">
-            <a:schemeClr val="accent6"/>
-          </a:fillRef>
-          <a:effectRef idx="2">
-            <a:schemeClr val="accent6"/>
-          </a:effectRef>
-          <a:fontRef idx="minor">
-            <a:schemeClr val="tx1"/>
-          </a:fontRef>
-        </p:style>
-      </p:cxnSp>
-      <p:cxnSp>
-        <p:nvCxnSpPr>
-          <p:cNvPr id="20" name="Straight Arrow Connector 19">
-            <a:extLst>
-              <a:ext uri="{FF2B5EF4-FFF2-40B4-BE49-F238E27FC236}">
-                <a16:creationId xmlns:a16="http://schemas.microsoft.com/office/drawing/2014/main" id="{DA4056E3-534D-4F0F-AE4A-4C48C4456994}"/>
-              </a:ext>
-            </a:extLst>
-          </p:cNvPr>
-          <p:cNvCxnSpPr>
-            <a:cxnSpLocks/>
-          </p:cNvCxnSpPr>
-          <p:nvPr/>
-        </p:nvCxnSpPr>
-        <p:spPr>
-          <a:xfrm flipV="1">
-            <a:off x="5827939" y="5374485"/>
-            <a:ext cx="1831522" cy="278612"/>
-          </a:xfrm>
-          <a:prstGeom prst="straightConnector1">
-            <a:avLst/>
-          </a:prstGeom>
-          <a:ln>
-            <a:headEnd type="triangle"/>
-            <a:tailEnd type="triangle"/>
-          </a:ln>
-        </p:spPr>
-        <p:style>
-          <a:lnRef idx="3">
-            <a:schemeClr val="accent6"/>
-          </a:lnRef>
-          <a:fillRef idx="0">
-            <a:schemeClr val="accent6"/>
-          </a:fillRef>
-          <a:effectRef idx="2">
-            <a:schemeClr val="accent6"/>
-          </a:effectRef>
-          <a:fontRef idx="minor">
-            <a:schemeClr val="tx1"/>
-          </a:fontRef>
-        </p:style>
-      </p:cxnSp>
-      <p:cxnSp>
-        <p:nvCxnSpPr>
-          <p:cNvPr id="24" name="Straight Arrow Connector 23">
-            <a:extLst>
-              <a:ext uri="{FF2B5EF4-FFF2-40B4-BE49-F238E27FC236}">
-                <a16:creationId xmlns:a16="http://schemas.microsoft.com/office/drawing/2014/main" id="{00D4D427-90FE-4642-B2C1-F0A5E0D7D2D8}"/>
-              </a:ext>
-            </a:extLst>
-          </p:cNvPr>
-          <p:cNvCxnSpPr>
-            <a:cxnSpLocks/>
-          </p:cNvCxnSpPr>
-          <p:nvPr/>
-        </p:nvCxnSpPr>
-        <p:spPr>
-          <a:xfrm>
-            <a:off x="1911803" y="3782960"/>
-            <a:ext cx="2420711" cy="0"/>
-          </a:xfrm>
-          <a:prstGeom prst="straightConnector1">
-            <a:avLst/>
-          </a:prstGeom>
-          <a:ln>
-            <a:headEnd type="triangle"/>
-            <a:tailEnd type="triangle"/>
-          </a:ln>
-        </p:spPr>
-        <p:style>
-          <a:lnRef idx="3">
-            <a:schemeClr val="accent6"/>
-          </a:lnRef>
-          <a:fillRef idx="0">
-            <a:schemeClr val="accent6"/>
-          </a:fillRef>
-          <a:effectRef idx="2">
-            <a:schemeClr val="accent6"/>
-          </a:effectRef>
-          <a:fontRef idx="minor">
-            <a:schemeClr val="tx1"/>
-          </a:fontRef>
-        </p:style>
-      </p:cxnSp>
       <p:sp>
         <p:nvSpPr>
           <p:cNvPr id="26" name="Footer Placeholder 25">
@@ -13215,16 +12578,316 @@
           </a:p>
         </p:txBody>
       </p:sp>
+      <p:sp>
+        <p:nvSpPr>
+          <p:cNvPr id="5" name="Content Placeholder 2">
+            <a:extLst>
+              <a:ext uri="{FF2B5EF4-FFF2-40B4-BE49-F238E27FC236}">
+                <a16:creationId xmlns:a16="http://schemas.microsoft.com/office/drawing/2014/main" id="{A02B38D0-9F65-4381-ADA5-124FA559027D}"/>
+              </a:ext>
+            </a:extLst>
+          </p:cNvPr>
+          <p:cNvSpPr>
+            <a:spLocks noGrp="1"/>
+          </p:cNvSpPr>
+          <p:nvPr>
+            <p:ph idx="1"/>
+          </p:nvPr>
+        </p:nvSpPr>
+        <p:spPr>
+          <a:xfrm>
+            <a:off x="1066800" y="2103120"/>
+            <a:ext cx="10058400" cy="3849624"/>
+          </a:xfrm>
+          <a:solidFill>
+            <a:schemeClr val="accent1">
+              <a:lumMod val="20000"/>
+              <a:lumOff val="80000"/>
+            </a:schemeClr>
+          </a:solidFill>
+        </p:spPr>
+        <p:txBody>
+          <a:bodyPr>
+            <a:normAutofit/>
+          </a:bodyPr>
+          <a:lstStyle/>
+          <a:p>
+            <a:pPr algn="ctr"/>
+            <a:r>
+              <a:rPr lang="en-IN" dirty="0">
+                <a:hlinkClick r:id="rId2"/>
+              </a:rPr>
+              <a:t>https://cloud.spring.io/spring-cloud-netflix/multi/multi__router_and_filter_zuul.html#_management_endpoints</a:t>
+            </a:r>
+            <a:endParaRPr lang="en-IN" dirty="0"/>
+          </a:p>
+        </p:txBody>
+      </p:sp>
     </p:spTree>
     <p:extLst>
       <p:ext uri="{BB962C8B-B14F-4D97-AF65-F5344CB8AC3E}">
-        <p14:creationId xmlns:p14="http://schemas.microsoft.com/office/powerpoint/2010/main" val="3788687606"/>
+        <p14:creationId xmlns:p14="http://schemas.microsoft.com/office/powerpoint/2010/main" val="2658207682"/>
       </p:ext>
     </p:extLst>
   </p:cSld>
   <p:clrMapOvr>
     <a:masterClrMapping/>
   </p:clrMapOvr>
+  <p:timing>
+    <p:tnLst>
+      <p:par>
+        <p:cTn id="1" dur="indefinite" restart="never" nodeType="tmRoot">
+          <p:childTnLst>
+            <p:seq concurrent="1" nextAc="seek">
+              <p:cTn id="2" dur="indefinite" nodeType="mainSeq">
+                <p:childTnLst>
+                  <p:par>
+                    <p:cTn id="3" fill="hold">
+                      <p:stCondLst>
+                        <p:cond delay="indefinite"/>
+                      </p:stCondLst>
+                      <p:childTnLst>
+                        <p:par>
+                          <p:cTn id="4" fill="hold">
+                            <p:stCondLst>
+                              <p:cond delay="0"/>
+                            </p:stCondLst>
+                            <p:childTnLst>
+                              <p:par>
+                                <p:cTn id="5" presetID="42" presetClass="entr" presetSubtype="0" fill="hold" grpId="0" nodeType="clickEffect">
+                                  <p:stCondLst>
+                                    <p:cond delay="0"/>
+                                  </p:stCondLst>
+                                  <p:childTnLst>
+                                    <p:set>
+                                      <p:cBhvr>
+                                        <p:cTn id="6" dur="1" fill="hold">
+                                          <p:stCondLst>
+                                            <p:cond delay="0"/>
+                                          </p:stCondLst>
+                                        </p:cTn>
+                                        <p:tgtEl>
+                                          <p:spTgt spid="5">
+                                            <p:bg/>
+                                          </p:spTgt>
+                                        </p:tgtEl>
+                                        <p:attrNameLst>
+                                          <p:attrName>style.visibility</p:attrName>
+                                        </p:attrNameLst>
+                                      </p:cBhvr>
+                                      <p:to>
+                                        <p:strVal val="visible"/>
+                                      </p:to>
+                                    </p:set>
+                                    <p:animEffect transition="in" filter="fade">
+                                      <p:cBhvr>
+                                        <p:cTn id="7" dur="1000"/>
+                                        <p:tgtEl>
+                                          <p:spTgt spid="5">
+                                            <p:bg/>
+                                          </p:spTgt>
+                                        </p:tgtEl>
+                                      </p:cBhvr>
+                                    </p:animEffect>
+                                    <p:anim calcmode="lin" valueType="num">
+                                      <p:cBhvr>
+                                        <p:cTn id="8" dur="1000" fill="hold"/>
+                                        <p:tgtEl>
+                                          <p:spTgt spid="5">
+                                            <p:bg/>
+                                          </p:spTgt>
+                                        </p:tgtEl>
+                                        <p:attrNameLst>
+                                          <p:attrName>ppt_x</p:attrName>
+                                        </p:attrNameLst>
+                                      </p:cBhvr>
+                                      <p:tavLst>
+                                        <p:tav tm="0">
+                                          <p:val>
+                                            <p:strVal val="#ppt_x"/>
+                                          </p:val>
+                                        </p:tav>
+                                        <p:tav tm="100000">
+                                          <p:val>
+                                            <p:strVal val="#ppt_x"/>
+                                          </p:val>
+                                        </p:tav>
+                                      </p:tavLst>
+                                    </p:anim>
+                                    <p:anim calcmode="lin" valueType="num">
+                                      <p:cBhvr>
+                                        <p:cTn id="9" dur="1000" fill="hold"/>
+                                        <p:tgtEl>
+                                          <p:spTgt spid="5">
+                                            <p:bg/>
+                                          </p:spTgt>
+                                        </p:tgtEl>
+                                        <p:attrNameLst>
+                                          <p:attrName>ppt_y</p:attrName>
+                                        </p:attrNameLst>
+                                      </p:cBhvr>
+                                      <p:tavLst>
+                                        <p:tav tm="0">
+                                          <p:val>
+                                            <p:strVal val="#ppt_y+.1"/>
+                                          </p:val>
+                                        </p:tav>
+                                        <p:tav tm="100000">
+                                          <p:val>
+                                            <p:strVal val="#ppt_y"/>
+                                          </p:val>
+                                        </p:tav>
+                                      </p:tavLst>
+                                    </p:anim>
+                                  </p:childTnLst>
+                                </p:cTn>
+                              </p:par>
+                            </p:childTnLst>
+                          </p:cTn>
+                        </p:par>
+                      </p:childTnLst>
+                    </p:cTn>
+                  </p:par>
+                  <p:par>
+                    <p:cTn id="10" fill="hold">
+                      <p:stCondLst>
+                        <p:cond delay="indefinite"/>
+                      </p:stCondLst>
+                      <p:childTnLst>
+                        <p:par>
+                          <p:cTn id="11" fill="hold">
+                            <p:stCondLst>
+                              <p:cond delay="0"/>
+                            </p:stCondLst>
+                            <p:childTnLst>
+                              <p:par>
+                                <p:cTn id="12" presetID="42" presetClass="entr" presetSubtype="0" fill="hold" grpId="0" nodeType="clickEffect">
+                                  <p:stCondLst>
+                                    <p:cond delay="0"/>
+                                  </p:stCondLst>
+                                  <p:childTnLst>
+                                    <p:set>
+                                      <p:cBhvr>
+                                        <p:cTn id="13" dur="1" fill="hold">
+                                          <p:stCondLst>
+                                            <p:cond delay="0"/>
+                                          </p:stCondLst>
+                                        </p:cTn>
+                                        <p:tgtEl>
+                                          <p:spTgt spid="5">
+                                            <p:txEl>
+                                              <p:pRg st="0" end="0"/>
+                                            </p:txEl>
+                                          </p:spTgt>
+                                        </p:tgtEl>
+                                        <p:attrNameLst>
+                                          <p:attrName>style.visibility</p:attrName>
+                                        </p:attrNameLst>
+                                      </p:cBhvr>
+                                      <p:to>
+                                        <p:strVal val="visible"/>
+                                      </p:to>
+                                    </p:set>
+                                    <p:animEffect transition="in" filter="fade">
+                                      <p:cBhvr>
+                                        <p:cTn id="14" dur="1000"/>
+                                        <p:tgtEl>
+                                          <p:spTgt spid="5">
+                                            <p:txEl>
+                                              <p:pRg st="0" end="0"/>
+                                            </p:txEl>
+                                          </p:spTgt>
+                                        </p:tgtEl>
+                                      </p:cBhvr>
+                                    </p:animEffect>
+                                    <p:anim calcmode="lin" valueType="num">
+                                      <p:cBhvr>
+                                        <p:cTn id="15" dur="1000" fill="hold"/>
+                                        <p:tgtEl>
+                                          <p:spTgt spid="5">
+                                            <p:txEl>
+                                              <p:pRg st="0" end="0"/>
+                                            </p:txEl>
+                                          </p:spTgt>
+                                        </p:tgtEl>
+                                        <p:attrNameLst>
+                                          <p:attrName>ppt_x</p:attrName>
+                                        </p:attrNameLst>
+                                      </p:cBhvr>
+                                      <p:tavLst>
+                                        <p:tav tm="0">
+                                          <p:val>
+                                            <p:strVal val="#ppt_x"/>
+                                          </p:val>
+                                        </p:tav>
+                                        <p:tav tm="100000">
+                                          <p:val>
+                                            <p:strVal val="#ppt_x"/>
+                                          </p:val>
+                                        </p:tav>
+                                      </p:tavLst>
+                                    </p:anim>
+                                    <p:anim calcmode="lin" valueType="num">
+                                      <p:cBhvr>
+                                        <p:cTn id="16" dur="1000" fill="hold"/>
+                                        <p:tgtEl>
+                                          <p:spTgt spid="5">
+                                            <p:txEl>
+                                              <p:pRg st="0" end="0"/>
+                                            </p:txEl>
+                                          </p:spTgt>
+                                        </p:tgtEl>
+                                        <p:attrNameLst>
+                                          <p:attrName>ppt_y</p:attrName>
+                                        </p:attrNameLst>
+                                      </p:cBhvr>
+                                      <p:tavLst>
+                                        <p:tav tm="0">
+                                          <p:val>
+                                            <p:strVal val="#ppt_y+.1"/>
+                                          </p:val>
+                                        </p:tav>
+                                        <p:tav tm="100000">
+                                          <p:val>
+                                            <p:strVal val="#ppt_y"/>
+                                          </p:val>
+                                        </p:tav>
+                                      </p:tavLst>
+                                    </p:anim>
+                                  </p:childTnLst>
+                                </p:cTn>
+                              </p:par>
+                            </p:childTnLst>
+                          </p:cTn>
+                        </p:par>
+                      </p:childTnLst>
+                    </p:cTn>
+                  </p:par>
+                </p:childTnLst>
+              </p:cTn>
+              <p:prevCondLst>
+                <p:cond evt="onPrev" delay="0">
+                  <p:tgtEl>
+                    <p:sldTgt/>
+                  </p:tgtEl>
+                </p:cond>
+              </p:prevCondLst>
+              <p:nextCondLst>
+                <p:cond evt="onNext" delay="0">
+                  <p:tgtEl>
+                    <p:sldTgt/>
+                  </p:tgtEl>
+                </p:cond>
+              </p:nextCondLst>
+            </p:seq>
+          </p:childTnLst>
+        </p:cTn>
+      </p:par>
+    </p:tnLst>
+    <p:bldLst>
+      <p:bldP spid="5" grpId="0" build="p" animBg="1"/>
+    </p:bldLst>
+  </p:timing>
 </p:sld>
 </file>
 
@@ -13395,17 +13058,17 @@
               </a:rPr>
             </a:br>
             <a:r>
-              <a:rPr lang="en-IN" sz="8000" b="1" dirty="0">
+              <a:rPr lang="en-IN" sz="8900" b="1" dirty="0">
                 <a:solidFill>
-                  <a:srgbClr val="00B050"/>
+                  <a:srgbClr val="7030A0"/>
                 </a:solidFill>
                 <a:latin typeface="Algerian" panose="04020705040A02060702" pitchFamily="82" charset="0"/>
               </a:rPr>
-              <a:t>security</a:t>
+              <a:t>LOGGING/AUDITING</a:t>
             </a:r>
             <a:endParaRPr lang="en-IN" sz="13800" b="1" dirty="0">
               <a:solidFill>
-                <a:srgbClr val="00B050"/>
+                <a:srgbClr val="002060"/>
               </a:solidFill>
               <a:latin typeface="Algerian" panose="04020705040A02060702" pitchFamily="82" charset="0"/>
             </a:endParaRPr>
@@ -13537,7 +13200,7 @@
     </p:spTree>
     <p:extLst>
       <p:ext uri="{BB962C8B-B14F-4D97-AF65-F5344CB8AC3E}">
-        <p14:creationId xmlns:p14="http://schemas.microsoft.com/office/powerpoint/2010/main" val="3744308151"/>
+        <p14:creationId xmlns:p14="http://schemas.microsoft.com/office/powerpoint/2010/main" val="2991444212"/>
       </p:ext>
     </p:extLst>
   </p:cSld>
@@ -14313,6 +13976,1101 @@
     </p:spTree>
     <p:extLst>
       <p:ext uri="{BB962C8B-B14F-4D97-AF65-F5344CB8AC3E}">
+        <p14:creationId xmlns:p14="http://schemas.microsoft.com/office/powerpoint/2010/main" val="3788687606"/>
+      </p:ext>
+    </p:extLst>
+  </p:cSld>
+  <p:clrMapOvr>
+    <a:masterClrMapping/>
+  </p:clrMapOvr>
+</p:sld>
+</file>
+
+<file path=ppt/slides/slide27.xml><?xml version="1.0" encoding="utf-8"?>
+<p:sld xmlns:a="http://schemas.openxmlformats.org/drawingml/2006/main" xmlns:r="http://schemas.openxmlformats.org/officeDocument/2006/relationships" xmlns:p="http://schemas.openxmlformats.org/presentationml/2006/main">
+  <p:cSld>
+    <p:bg>
+      <p:bgPr>
+        <a:solidFill>
+          <a:schemeClr val="bg1"/>
+        </a:solidFill>
+        <a:effectLst/>
+      </p:bgPr>
+    </p:bg>
+    <p:spTree>
+      <p:nvGrpSpPr>
+        <p:cNvPr id="1" name=""/>
+        <p:cNvGrpSpPr/>
+        <p:nvPr/>
+      </p:nvGrpSpPr>
+      <p:grpSpPr>
+        <a:xfrm>
+          <a:off x="0" y="0"/>
+          <a:ext cx="0" cy="0"/>
+          <a:chOff x="0" y="0"/>
+          <a:chExt cx="0" cy="0"/>
+        </a:xfrm>
+      </p:grpSpPr>
+      <p:pic>
+        <p:nvPicPr>
+          <p:cNvPr id="15" name="Picture 3">
+            <a:extLst>
+              <a:ext uri="{FF2B5EF4-FFF2-40B4-BE49-F238E27FC236}">
+                <a16:creationId xmlns:a16="http://schemas.microsoft.com/office/drawing/2014/main" id="{0785719F-1A65-49E3-AC9E-639309D4D0B0}"/>
+              </a:ext>
+            </a:extLst>
+          </p:cNvPr>
+          <p:cNvPicPr>
+            <a:picLocks noChangeAspect="1"/>
+          </p:cNvPicPr>
+          <p:nvPr/>
+        </p:nvPicPr>
+        <p:blipFill rotWithShape="1">
+          <a:blip r:embed="rId3"/>
+          <a:srcRect t="15730"/>
+          <a:stretch/>
+        </p:blipFill>
+        <p:spPr>
+          <a:xfrm>
+            <a:off x="21" y="-9524"/>
+            <a:ext cx="12191979" cy="6857990"/>
+          </a:xfrm>
+          <a:prstGeom prst="rect">
+            <a:avLst/>
+          </a:prstGeom>
+        </p:spPr>
+      </p:pic>
+      <p:sp>
+        <p:nvSpPr>
+          <p:cNvPr id="2" name="Title 1">
+            <a:extLst>
+              <a:ext uri="{FF2B5EF4-FFF2-40B4-BE49-F238E27FC236}">
+                <a16:creationId xmlns:a16="http://schemas.microsoft.com/office/drawing/2014/main" id="{5ED652C6-48A8-4B7E-94C4-A6E2E1AF0767}"/>
+              </a:ext>
+            </a:extLst>
+          </p:cNvPr>
+          <p:cNvSpPr>
+            <a:spLocks noGrp="1"/>
+          </p:cNvSpPr>
+          <p:nvPr>
+            <p:ph type="ctrTitle"/>
+          </p:nvPr>
+        </p:nvSpPr>
+        <p:spPr>
+          <a:xfrm>
+            <a:off x="1381125" y="333374"/>
+            <a:ext cx="9496425" cy="4162426"/>
+          </a:xfrm>
+          <a:solidFill>
+            <a:srgbClr val="92D050"/>
+          </a:solidFill>
+          <a:scene3d>
+            <a:camera prst="perspectiveLeft"/>
+            <a:lightRig rig="threePt" dir="t"/>
+          </a:scene3d>
+        </p:spPr>
+        <p:txBody>
+          <a:bodyPr>
+            <a:normAutofit fontScale="90000"/>
+          </a:bodyPr>
+          <a:lstStyle/>
+          <a:p>
+            <a:r>
+              <a:rPr lang="en-IN" sz="5400" b="1" dirty="0">
+                <a:solidFill>
+                  <a:schemeClr val="tx1"/>
+                </a:solidFill>
+                <a:latin typeface="Algerian" panose="04020705040A02060702" pitchFamily="82" charset="0"/>
+              </a:rPr>
+              <a:t>API GATEWAY</a:t>
+            </a:r>
+            <a:br>
+              <a:rPr lang="en-IN" sz="5400" b="1" dirty="0">
+                <a:solidFill>
+                  <a:schemeClr val="tx1"/>
+                </a:solidFill>
+                <a:latin typeface="Algerian" panose="04020705040A02060702" pitchFamily="82" charset="0"/>
+              </a:rPr>
+            </a:br>
+            <a:r>
+              <a:rPr lang="en-IN" sz="5400" b="1" dirty="0">
+                <a:solidFill>
+                  <a:schemeClr val="tx1"/>
+                </a:solidFill>
+                <a:latin typeface="Algerian" panose="04020705040A02060702" pitchFamily="82" charset="0"/>
+              </a:rPr>
+              <a:t>in</a:t>
+            </a:r>
+            <a:br>
+              <a:rPr lang="en-IN" sz="5400" b="1" dirty="0">
+                <a:solidFill>
+                  <a:schemeClr val="tx1"/>
+                </a:solidFill>
+                <a:latin typeface="Algerian" panose="04020705040A02060702" pitchFamily="82" charset="0"/>
+              </a:rPr>
+            </a:br>
+            <a:r>
+              <a:rPr lang="en-IN" sz="5400" b="1" dirty="0">
+                <a:solidFill>
+                  <a:schemeClr val="tx1"/>
+                </a:solidFill>
+                <a:latin typeface="Algerian" panose="04020705040A02060702" pitchFamily="82" charset="0"/>
+              </a:rPr>
+              <a:t>microservices</a:t>
+            </a:r>
+            <a:br>
+              <a:rPr lang="en-IN" sz="8000" b="1" dirty="0">
+                <a:solidFill>
+                  <a:schemeClr val="tx1"/>
+                </a:solidFill>
+                <a:latin typeface="Algerian" panose="04020705040A02060702" pitchFamily="82" charset="0"/>
+              </a:rPr>
+            </a:br>
+            <a:r>
+              <a:rPr lang="en-IN" sz="8000" b="1" u="sng" dirty="0">
+                <a:solidFill>
+                  <a:srgbClr val="FF0000"/>
+                </a:solidFill>
+                <a:latin typeface="Algerian" panose="04020705040A02060702" pitchFamily="82" charset="0"/>
+              </a:rPr>
+              <a:t>Netflix </a:t>
+            </a:r>
+            <a:r>
+              <a:rPr lang="en-IN" sz="8000" b="1" u="sng" dirty="0" err="1">
+                <a:solidFill>
+                  <a:srgbClr val="FF0000"/>
+                </a:solidFill>
+                <a:latin typeface="Algerian" panose="04020705040A02060702" pitchFamily="82" charset="0"/>
+              </a:rPr>
+              <a:t>Zuul</a:t>
+            </a:r>
+            <a:br>
+              <a:rPr lang="en-IN" sz="8000" b="1" dirty="0">
+                <a:solidFill>
+                  <a:srgbClr val="FF0000"/>
+                </a:solidFill>
+                <a:latin typeface="Algerian" panose="04020705040A02060702" pitchFamily="82" charset="0"/>
+              </a:rPr>
+            </a:br>
+            <a:r>
+              <a:rPr lang="en-IN" sz="8000" b="1" dirty="0">
+                <a:solidFill>
+                  <a:srgbClr val="00B050"/>
+                </a:solidFill>
+                <a:latin typeface="Algerian" panose="04020705040A02060702" pitchFamily="82" charset="0"/>
+              </a:rPr>
+              <a:t>security</a:t>
+            </a:r>
+            <a:endParaRPr lang="en-IN" sz="13800" b="1" dirty="0">
+              <a:solidFill>
+                <a:srgbClr val="00B050"/>
+              </a:solidFill>
+              <a:latin typeface="Algerian" panose="04020705040A02060702" pitchFamily="82" charset="0"/>
+            </a:endParaRPr>
+          </a:p>
+        </p:txBody>
+      </p:sp>
+      <p:sp>
+        <p:nvSpPr>
+          <p:cNvPr id="6" name="Footer Placeholder 5">
+            <a:extLst>
+              <a:ext uri="{FF2B5EF4-FFF2-40B4-BE49-F238E27FC236}">
+                <a16:creationId xmlns:a16="http://schemas.microsoft.com/office/drawing/2014/main" id="{27BCB787-CA0B-4A63-8585-D7FB76B4BE4D}"/>
+              </a:ext>
+            </a:extLst>
+          </p:cNvPr>
+          <p:cNvSpPr>
+            <a:spLocks noGrp="1"/>
+          </p:cNvSpPr>
+          <p:nvPr>
+            <p:ph type="ftr" sz="quarter" idx="11"/>
+          </p:nvPr>
+        </p:nvSpPr>
+        <p:spPr>
+          <a:xfrm>
+            <a:off x="0" y="6619866"/>
+            <a:ext cx="5730295" cy="228600"/>
+          </a:xfrm>
+        </p:spPr>
+        <p:txBody>
+          <a:bodyPr/>
+          <a:lstStyle/>
+          <a:p>
+            <a:r>
+              <a:rPr lang="en-US" dirty="0"/>
+              <a:t>Follow us on https://facebook.com/greenlearner</a:t>
+            </a:r>
+          </a:p>
+        </p:txBody>
+      </p:sp>
+      <p:sp>
+        <p:nvSpPr>
+          <p:cNvPr id="5" name="Rectangle: Single Corner Snipped 4">
+            <a:extLst>
+              <a:ext uri="{FF2B5EF4-FFF2-40B4-BE49-F238E27FC236}">
+                <a16:creationId xmlns:a16="http://schemas.microsoft.com/office/drawing/2014/main" id="{C2B582A3-2343-4328-B6E9-EBBD7996AA9D}"/>
+              </a:ext>
+            </a:extLst>
+          </p:cNvPr>
+          <p:cNvSpPr/>
+          <p:nvPr/>
+        </p:nvSpPr>
+        <p:spPr>
+          <a:xfrm>
+            <a:off x="1" y="-28570"/>
+            <a:ext cx="1381124" cy="428620"/>
+          </a:xfrm>
+          <a:prstGeom prst="snip1Rect">
+            <a:avLst/>
+          </a:prstGeom>
+        </p:spPr>
+        <p:style>
+          <a:lnRef idx="2">
+            <a:schemeClr val="accent1">
+              <a:shade val="50000"/>
+            </a:schemeClr>
+          </a:lnRef>
+          <a:fillRef idx="1">
+            <a:schemeClr val="accent1"/>
+          </a:fillRef>
+          <a:effectRef idx="0">
+            <a:schemeClr val="accent1"/>
+          </a:effectRef>
+          <a:fontRef idx="minor">
+            <a:schemeClr val="lt1"/>
+          </a:fontRef>
+        </p:style>
+        <p:txBody>
+          <a:bodyPr rtlCol="0" anchor="ctr"/>
+          <a:lstStyle/>
+          <a:p>
+            <a:pPr algn="ctr"/>
+            <a:r>
+              <a:rPr lang="en-IN" b="1" dirty="0"/>
+              <a:t>ARVIND</a:t>
+            </a:r>
+          </a:p>
+        </p:txBody>
+      </p:sp>
+      <p:pic>
+        <p:nvPicPr>
+          <p:cNvPr id="9" name="Picture 8">
+            <a:extLst>
+              <a:ext uri="{FF2B5EF4-FFF2-40B4-BE49-F238E27FC236}">
+                <a16:creationId xmlns:a16="http://schemas.microsoft.com/office/drawing/2014/main" id="{559E28E8-6B4D-4759-9471-A270BA38F909}"/>
+              </a:ext>
+            </a:extLst>
+          </p:cNvPr>
+          <p:cNvPicPr>
+            <a:picLocks noChangeAspect="1"/>
+          </p:cNvPicPr>
+          <p:nvPr/>
+        </p:nvPicPr>
+        <p:blipFill>
+          <a:blip r:embed="rId4"/>
+          <a:stretch>
+            <a:fillRect/>
+          </a:stretch>
+        </p:blipFill>
+        <p:spPr>
+          <a:xfrm>
+            <a:off x="3964903" y="4981560"/>
+            <a:ext cx="4262193" cy="2028826"/>
+          </a:xfrm>
+          <a:prstGeom prst="rect">
+            <a:avLst/>
+          </a:prstGeom>
+          <a:ln>
+            <a:noFill/>
+          </a:ln>
+          <a:effectLst>
+            <a:outerShdw blurRad="292100" dist="139700" dir="2700000" algn="tl" rotWithShape="0">
+              <a:srgbClr val="333333">
+                <a:alpha val="65000"/>
+              </a:srgbClr>
+            </a:outerShdw>
+          </a:effectLst>
+        </p:spPr>
+      </p:pic>
+    </p:spTree>
+    <p:extLst>
+      <p:ext uri="{BB962C8B-B14F-4D97-AF65-F5344CB8AC3E}">
+        <p14:creationId xmlns:p14="http://schemas.microsoft.com/office/powerpoint/2010/main" val="3744308151"/>
+      </p:ext>
+    </p:extLst>
+  </p:cSld>
+  <p:clrMapOvr>
+    <a:overrideClrMapping bg1="dk1" tx1="lt1" bg2="dk2" tx2="lt2" accent1="accent1" accent2="accent2" accent3="accent3" accent4="accent4" accent5="accent5" accent6="accent6" hlink="hlink" folHlink="folHlink"/>
+  </p:clrMapOvr>
+</p:sld>
+</file>
+
+<file path=ppt/slides/slide28.xml><?xml version="1.0" encoding="utf-8"?>
+<p:sld xmlns:a="http://schemas.openxmlformats.org/drawingml/2006/main" xmlns:r="http://schemas.openxmlformats.org/officeDocument/2006/relationships" xmlns:p="http://schemas.openxmlformats.org/presentationml/2006/main">
+  <p:cSld>
+    <p:spTree>
+      <p:nvGrpSpPr>
+        <p:cNvPr id="1" name=""/>
+        <p:cNvGrpSpPr/>
+        <p:nvPr/>
+      </p:nvGrpSpPr>
+      <p:grpSpPr>
+        <a:xfrm>
+          <a:off x="0" y="0"/>
+          <a:ext cx="0" cy="0"/>
+          <a:chOff x="0" y="0"/>
+          <a:chExt cx="0" cy="0"/>
+        </a:xfrm>
+      </p:grpSpPr>
+      <p:sp>
+        <p:nvSpPr>
+          <p:cNvPr id="2" name="Title 1">
+            <a:extLst>
+              <a:ext uri="{FF2B5EF4-FFF2-40B4-BE49-F238E27FC236}">
+                <a16:creationId xmlns:a16="http://schemas.microsoft.com/office/drawing/2014/main" id="{4797AFF6-A869-4A8B-8D57-C575CE4625CA}"/>
+              </a:ext>
+            </a:extLst>
+          </p:cNvPr>
+          <p:cNvSpPr>
+            <a:spLocks noGrp="1"/>
+          </p:cNvSpPr>
+          <p:nvPr>
+            <p:ph type="title"/>
+          </p:nvPr>
+        </p:nvSpPr>
+        <p:spPr>
+          <a:gradFill flip="none" rotWithShape="1">
+            <a:gsLst>
+              <a:gs pos="0">
+                <a:srgbClr val="92D050">
+                  <a:tint val="66000"/>
+                  <a:satMod val="160000"/>
+                </a:srgbClr>
+              </a:gs>
+              <a:gs pos="50000">
+                <a:srgbClr val="92D050">
+                  <a:tint val="44500"/>
+                  <a:satMod val="160000"/>
+                </a:srgbClr>
+              </a:gs>
+              <a:gs pos="100000">
+                <a:srgbClr val="92D050">
+                  <a:tint val="23500"/>
+                  <a:satMod val="160000"/>
+                </a:srgbClr>
+              </a:gs>
+            </a:gsLst>
+            <a:lin ang="13500000" scaled="1"/>
+            <a:tileRect/>
+          </a:gradFill>
+        </p:spPr>
+        <p:txBody>
+          <a:bodyPr/>
+          <a:lstStyle/>
+          <a:p>
+            <a:r>
+              <a:rPr lang="en-IN" dirty="0"/>
+              <a:t>Solution – API gateway</a:t>
+            </a:r>
+          </a:p>
+        </p:txBody>
+      </p:sp>
+      <p:sp>
+        <p:nvSpPr>
+          <p:cNvPr id="4" name="Rectangle 3">
+            <a:extLst>
+              <a:ext uri="{FF2B5EF4-FFF2-40B4-BE49-F238E27FC236}">
+                <a16:creationId xmlns:a16="http://schemas.microsoft.com/office/drawing/2014/main" id="{42D1BCDD-0A79-4751-9426-B30935BEECB2}"/>
+              </a:ext>
+            </a:extLst>
+          </p:cNvPr>
+          <p:cNvSpPr/>
+          <p:nvPr/>
+        </p:nvSpPr>
+        <p:spPr>
+          <a:xfrm>
+            <a:off x="416378" y="3429000"/>
+            <a:ext cx="1495425" cy="962025"/>
+          </a:xfrm>
+          <a:prstGeom prst="rect">
+            <a:avLst/>
+          </a:prstGeom>
+        </p:spPr>
+        <p:style>
+          <a:lnRef idx="2">
+            <a:schemeClr val="accent1">
+              <a:shade val="50000"/>
+            </a:schemeClr>
+          </a:lnRef>
+          <a:fillRef idx="1">
+            <a:schemeClr val="accent1"/>
+          </a:fillRef>
+          <a:effectRef idx="0">
+            <a:schemeClr val="accent1"/>
+          </a:effectRef>
+          <a:fontRef idx="minor">
+            <a:schemeClr val="lt1"/>
+          </a:fontRef>
+        </p:style>
+        <p:txBody>
+          <a:bodyPr rtlCol="0" anchor="ctr"/>
+          <a:lstStyle/>
+          <a:p>
+            <a:pPr algn="ctr"/>
+            <a:r>
+              <a:rPr lang="en-IN" dirty="0"/>
+              <a:t>Front End- Dashboard</a:t>
+            </a:r>
+          </a:p>
+        </p:txBody>
+      </p:sp>
+      <p:sp>
+        <p:nvSpPr>
+          <p:cNvPr id="5" name="Rectangle 4">
+            <a:extLst>
+              <a:ext uri="{FF2B5EF4-FFF2-40B4-BE49-F238E27FC236}">
+                <a16:creationId xmlns:a16="http://schemas.microsoft.com/office/drawing/2014/main" id="{9599D53A-1255-459E-8252-E027A125760E}"/>
+              </a:ext>
+            </a:extLst>
+          </p:cNvPr>
+          <p:cNvSpPr/>
+          <p:nvPr/>
+        </p:nvSpPr>
+        <p:spPr>
+          <a:xfrm>
+            <a:off x="7659461" y="2014194"/>
+            <a:ext cx="1343025" cy="962025"/>
+          </a:xfrm>
+          <a:prstGeom prst="rect">
+            <a:avLst/>
+          </a:prstGeom>
+        </p:spPr>
+        <p:style>
+          <a:lnRef idx="2">
+            <a:schemeClr val="accent1">
+              <a:shade val="50000"/>
+            </a:schemeClr>
+          </a:lnRef>
+          <a:fillRef idx="1">
+            <a:schemeClr val="accent1"/>
+          </a:fillRef>
+          <a:effectRef idx="0">
+            <a:schemeClr val="accent1"/>
+          </a:effectRef>
+          <a:fontRef idx="minor">
+            <a:schemeClr val="lt1"/>
+          </a:fontRef>
+        </p:style>
+        <p:txBody>
+          <a:bodyPr rtlCol="0" anchor="ctr"/>
+          <a:lstStyle/>
+          <a:p>
+            <a:pPr algn="ctr"/>
+            <a:r>
+              <a:rPr lang="en-IN" dirty="0"/>
+              <a:t>Doctor’s details</a:t>
+            </a:r>
+          </a:p>
+        </p:txBody>
+      </p:sp>
+      <p:sp>
+        <p:nvSpPr>
+          <p:cNvPr id="6" name="Rectangle 5">
+            <a:extLst>
+              <a:ext uri="{FF2B5EF4-FFF2-40B4-BE49-F238E27FC236}">
+                <a16:creationId xmlns:a16="http://schemas.microsoft.com/office/drawing/2014/main" id="{BEDB7F33-BD99-4854-BB7E-AB8C3DABA793}"/>
+              </a:ext>
+            </a:extLst>
+          </p:cNvPr>
+          <p:cNvSpPr/>
+          <p:nvPr/>
+        </p:nvSpPr>
+        <p:spPr>
+          <a:xfrm>
+            <a:off x="7659461" y="3429000"/>
+            <a:ext cx="1343025" cy="962025"/>
+          </a:xfrm>
+          <a:prstGeom prst="rect">
+            <a:avLst/>
+          </a:prstGeom>
+        </p:spPr>
+        <p:style>
+          <a:lnRef idx="2">
+            <a:schemeClr val="accent1">
+              <a:shade val="50000"/>
+            </a:schemeClr>
+          </a:lnRef>
+          <a:fillRef idx="1">
+            <a:schemeClr val="accent1"/>
+          </a:fillRef>
+          <a:effectRef idx="0">
+            <a:schemeClr val="accent1"/>
+          </a:effectRef>
+          <a:fontRef idx="minor">
+            <a:schemeClr val="lt1"/>
+          </a:fontRef>
+        </p:style>
+        <p:txBody>
+          <a:bodyPr rtlCol="0" anchor="ctr"/>
+          <a:lstStyle/>
+          <a:p>
+            <a:pPr algn="ctr"/>
+            <a:r>
+              <a:rPr lang="en-IN" dirty="0"/>
+              <a:t>Patient details</a:t>
+            </a:r>
+          </a:p>
+        </p:txBody>
+      </p:sp>
+      <p:sp>
+        <p:nvSpPr>
+          <p:cNvPr id="7" name="Rectangle 6">
+            <a:extLst>
+              <a:ext uri="{FF2B5EF4-FFF2-40B4-BE49-F238E27FC236}">
+                <a16:creationId xmlns:a16="http://schemas.microsoft.com/office/drawing/2014/main" id="{ABF2D441-45D6-4CF7-9092-B3B87635C2A8}"/>
+              </a:ext>
+            </a:extLst>
+          </p:cNvPr>
+          <p:cNvSpPr/>
+          <p:nvPr/>
+        </p:nvSpPr>
+        <p:spPr>
+          <a:xfrm>
+            <a:off x="7659461" y="4893473"/>
+            <a:ext cx="1343025" cy="962025"/>
+          </a:xfrm>
+          <a:prstGeom prst="rect">
+            <a:avLst/>
+          </a:prstGeom>
+        </p:spPr>
+        <p:style>
+          <a:lnRef idx="2">
+            <a:schemeClr val="accent1">
+              <a:shade val="50000"/>
+            </a:schemeClr>
+          </a:lnRef>
+          <a:fillRef idx="1">
+            <a:schemeClr val="accent1"/>
+          </a:fillRef>
+          <a:effectRef idx="0">
+            <a:schemeClr val="accent1"/>
+          </a:effectRef>
+          <a:fontRef idx="minor">
+            <a:schemeClr val="lt1"/>
+          </a:fontRef>
+        </p:style>
+        <p:txBody>
+          <a:bodyPr rtlCol="0" anchor="ctr"/>
+          <a:lstStyle/>
+          <a:p>
+            <a:pPr algn="ctr"/>
+            <a:r>
+              <a:rPr lang="en-IN" dirty="0"/>
+              <a:t>Medicine details</a:t>
+            </a:r>
+          </a:p>
+        </p:txBody>
+      </p:sp>
+      <p:sp>
+        <p:nvSpPr>
+          <p:cNvPr id="8" name="Rectangle 7">
+            <a:extLst>
+              <a:ext uri="{FF2B5EF4-FFF2-40B4-BE49-F238E27FC236}">
+                <a16:creationId xmlns:a16="http://schemas.microsoft.com/office/drawing/2014/main" id="{747949E8-69F7-4ACE-9B00-8DA77B33BF5D}"/>
+              </a:ext>
+            </a:extLst>
+          </p:cNvPr>
+          <p:cNvSpPr/>
+          <p:nvPr/>
+        </p:nvSpPr>
+        <p:spPr>
+          <a:xfrm>
+            <a:off x="9782175" y="3910012"/>
+            <a:ext cx="1343025" cy="962025"/>
+          </a:xfrm>
+          <a:prstGeom prst="rect">
+            <a:avLst/>
+          </a:prstGeom>
+        </p:spPr>
+        <p:style>
+          <a:lnRef idx="2">
+            <a:schemeClr val="accent1">
+              <a:shade val="50000"/>
+            </a:schemeClr>
+          </a:lnRef>
+          <a:fillRef idx="1">
+            <a:schemeClr val="accent1"/>
+          </a:fillRef>
+          <a:effectRef idx="0">
+            <a:schemeClr val="accent1"/>
+          </a:effectRef>
+          <a:fontRef idx="minor">
+            <a:schemeClr val="lt1"/>
+          </a:fontRef>
+        </p:style>
+        <p:txBody>
+          <a:bodyPr rtlCol="0" anchor="ctr"/>
+          <a:lstStyle/>
+          <a:p>
+            <a:pPr algn="ctr"/>
+            <a:r>
+              <a:rPr lang="en-IN" dirty="0"/>
+              <a:t>Location details</a:t>
+            </a:r>
+          </a:p>
+        </p:txBody>
+      </p:sp>
+      <p:sp>
+        <p:nvSpPr>
+          <p:cNvPr id="9" name="Rectangle 8">
+            <a:extLst>
+              <a:ext uri="{FF2B5EF4-FFF2-40B4-BE49-F238E27FC236}">
+                <a16:creationId xmlns:a16="http://schemas.microsoft.com/office/drawing/2014/main" id="{88E345F7-CEA1-4853-AAC9-8C7E05A64159}"/>
+              </a:ext>
+            </a:extLst>
+          </p:cNvPr>
+          <p:cNvSpPr/>
+          <p:nvPr/>
+        </p:nvSpPr>
+        <p:spPr>
+          <a:xfrm>
+            <a:off x="9782175" y="2240584"/>
+            <a:ext cx="1343025" cy="962025"/>
+          </a:xfrm>
+          <a:prstGeom prst="rect">
+            <a:avLst/>
+          </a:prstGeom>
+        </p:spPr>
+        <p:style>
+          <a:lnRef idx="2">
+            <a:schemeClr val="accent1">
+              <a:shade val="50000"/>
+            </a:schemeClr>
+          </a:lnRef>
+          <a:fillRef idx="1">
+            <a:schemeClr val="accent1"/>
+          </a:fillRef>
+          <a:effectRef idx="0">
+            <a:schemeClr val="accent1"/>
+          </a:effectRef>
+          <a:fontRef idx="minor">
+            <a:schemeClr val="lt1"/>
+          </a:fontRef>
+        </p:style>
+        <p:txBody>
+          <a:bodyPr rtlCol="0" anchor="ctr"/>
+          <a:lstStyle/>
+          <a:p>
+            <a:pPr algn="ctr"/>
+            <a:r>
+              <a:rPr lang="en-IN" dirty="0"/>
+              <a:t>Disease details</a:t>
+            </a:r>
+          </a:p>
+        </p:txBody>
+      </p:sp>
+      <p:sp>
+        <p:nvSpPr>
+          <p:cNvPr id="3" name="Rectangle: Rounded Corners 2">
+            <a:extLst>
+              <a:ext uri="{FF2B5EF4-FFF2-40B4-BE49-F238E27FC236}">
+                <a16:creationId xmlns:a16="http://schemas.microsoft.com/office/drawing/2014/main" id="{0241E15A-0801-479B-BEB5-964D1994DECD}"/>
+              </a:ext>
+            </a:extLst>
+          </p:cNvPr>
+          <p:cNvSpPr/>
+          <p:nvPr/>
+        </p:nvSpPr>
+        <p:spPr>
+          <a:xfrm>
+            <a:off x="4332514" y="2014194"/>
+            <a:ext cx="1495425" cy="4386606"/>
+          </a:xfrm>
+          <a:prstGeom prst="roundRect">
+            <a:avLst/>
+          </a:prstGeom>
+          <a:solidFill>
+            <a:srgbClr val="92D050"/>
+          </a:solidFill>
+          <a:ln>
+            <a:solidFill>
+              <a:srgbClr val="92D050"/>
+            </a:solidFill>
+          </a:ln>
+        </p:spPr>
+        <p:style>
+          <a:lnRef idx="2">
+            <a:schemeClr val="accent1">
+              <a:shade val="50000"/>
+            </a:schemeClr>
+          </a:lnRef>
+          <a:fillRef idx="1">
+            <a:schemeClr val="accent1"/>
+          </a:fillRef>
+          <a:effectRef idx="0">
+            <a:schemeClr val="accent1"/>
+          </a:effectRef>
+          <a:fontRef idx="minor">
+            <a:schemeClr val="lt1"/>
+          </a:fontRef>
+        </p:style>
+        <p:txBody>
+          <a:bodyPr rtlCol="0" anchor="ctr"/>
+          <a:lstStyle/>
+          <a:p>
+            <a:pPr algn="ctr"/>
+            <a:r>
+              <a:rPr lang="en-IN" sz="2800" b="1" dirty="0"/>
+              <a:t>A</a:t>
+            </a:r>
+          </a:p>
+          <a:p>
+            <a:pPr algn="ctr"/>
+            <a:r>
+              <a:rPr lang="en-IN" sz="2800" b="1" dirty="0"/>
+              <a:t>P</a:t>
+            </a:r>
+          </a:p>
+          <a:p>
+            <a:pPr algn="ctr"/>
+            <a:r>
+              <a:rPr lang="en-IN" sz="2800" b="1" dirty="0"/>
+              <a:t>I</a:t>
+            </a:r>
+          </a:p>
+          <a:p>
+            <a:pPr algn="ctr"/>
+            <a:r>
+              <a:rPr lang="en-IN" sz="2800" b="1" dirty="0"/>
+              <a:t>G</a:t>
+            </a:r>
+          </a:p>
+          <a:p>
+            <a:pPr algn="ctr"/>
+            <a:r>
+              <a:rPr lang="en-IN" sz="2800" b="1" dirty="0"/>
+              <a:t>A</a:t>
+            </a:r>
+          </a:p>
+          <a:p>
+            <a:pPr algn="ctr"/>
+            <a:r>
+              <a:rPr lang="en-IN" sz="2800" b="1" dirty="0"/>
+              <a:t>T</a:t>
+            </a:r>
+          </a:p>
+          <a:p>
+            <a:pPr algn="ctr"/>
+            <a:r>
+              <a:rPr lang="en-IN" sz="2800" b="1" dirty="0"/>
+              <a:t>E</a:t>
+            </a:r>
+          </a:p>
+          <a:p>
+            <a:pPr algn="ctr"/>
+            <a:r>
+              <a:rPr lang="en-IN" sz="2800" b="1" dirty="0"/>
+              <a:t>W</a:t>
+            </a:r>
+          </a:p>
+          <a:p>
+            <a:pPr algn="ctr"/>
+            <a:r>
+              <a:rPr lang="en-IN" sz="2800" b="1" dirty="0"/>
+              <a:t>A</a:t>
+            </a:r>
+          </a:p>
+          <a:p>
+            <a:pPr algn="ctr"/>
+            <a:r>
+              <a:rPr lang="en-IN" sz="2800" b="1" dirty="0"/>
+              <a:t>Y</a:t>
+            </a:r>
+          </a:p>
+        </p:txBody>
+      </p:sp>
+      <p:cxnSp>
+        <p:nvCxnSpPr>
+          <p:cNvPr id="11" name="Straight Arrow Connector 10">
+            <a:extLst>
+              <a:ext uri="{FF2B5EF4-FFF2-40B4-BE49-F238E27FC236}">
+                <a16:creationId xmlns:a16="http://schemas.microsoft.com/office/drawing/2014/main" id="{A874A2A6-CCF9-4AD8-8FC0-B159E27A45DE}"/>
+              </a:ext>
+            </a:extLst>
+          </p:cNvPr>
+          <p:cNvCxnSpPr>
+            <a:endCxn id="5" idx="1"/>
+          </p:cNvCxnSpPr>
+          <p:nvPr/>
+        </p:nvCxnSpPr>
+        <p:spPr>
+          <a:xfrm flipV="1">
+            <a:off x="5827939" y="2495207"/>
+            <a:ext cx="1831522" cy="481012"/>
+          </a:xfrm>
+          <a:prstGeom prst="straightConnector1">
+            <a:avLst/>
+          </a:prstGeom>
+          <a:ln>
+            <a:headEnd type="triangle"/>
+            <a:tailEnd type="triangle"/>
+          </a:ln>
+        </p:spPr>
+        <p:style>
+          <a:lnRef idx="3">
+            <a:schemeClr val="accent6"/>
+          </a:lnRef>
+          <a:fillRef idx="0">
+            <a:schemeClr val="accent6"/>
+          </a:fillRef>
+          <a:effectRef idx="2">
+            <a:schemeClr val="accent6"/>
+          </a:effectRef>
+          <a:fontRef idx="minor">
+            <a:schemeClr val="tx1"/>
+          </a:fontRef>
+        </p:style>
+      </p:cxnSp>
+      <p:cxnSp>
+        <p:nvCxnSpPr>
+          <p:cNvPr id="17" name="Straight Arrow Connector 16">
+            <a:extLst>
+              <a:ext uri="{FF2B5EF4-FFF2-40B4-BE49-F238E27FC236}">
+                <a16:creationId xmlns:a16="http://schemas.microsoft.com/office/drawing/2014/main" id="{698E21F8-F40C-4890-B8F6-538FA2D9BA16}"/>
+              </a:ext>
+            </a:extLst>
+          </p:cNvPr>
+          <p:cNvCxnSpPr>
+            <a:cxnSpLocks/>
+            <a:endCxn id="8" idx="1"/>
+          </p:cNvCxnSpPr>
+          <p:nvPr/>
+        </p:nvCxnSpPr>
+        <p:spPr>
+          <a:xfrm flipV="1">
+            <a:off x="5827939" y="4391025"/>
+            <a:ext cx="3954236" cy="759624"/>
+          </a:xfrm>
+          <a:prstGeom prst="straightConnector1">
+            <a:avLst/>
+          </a:prstGeom>
+          <a:ln>
+            <a:headEnd type="triangle"/>
+            <a:tailEnd type="triangle"/>
+          </a:ln>
+        </p:spPr>
+        <p:style>
+          <a:lnRef idx="3">
+            <a:schemeClr val="accent6"/>
+          </a:lnRef>
+          <a:fillRef idx="0">
+            <a:schemeClr val="accent6"/>
+          </a:fillRef>
+          <a:effectRef idx="2">
+            <a:schemeClr val="accent6"/>
+          </a:effectRef>
+          <a:fontRef idx="minor">
+            <a:schemeClr val="tx1"/>
+          </a:fontRef>
+        </p:style>
+      </p:cxnSp>
+      <p:cxnSp>
+        <p:nvCxnSpPr>
+          <p:cNvPr id="18" name="Straight Arrow Connector 17">
+            <a:extLst>
+              <a:ext uri="{FF2B5EF4-FFF2-40B4-BE49-F238E27FC236}">
+                <a16:creationId xmlns:a16="http://schemas.microsoft.com/office/drawing/2014/main" id="{C25130A0-9886-4F66-AD0D-8A1FEF7AC190}"/>
+              </a:ext>
+            </a:extLst>
+          </p:cNvPr>
+          <p:cNvCxnSpPr/>
+          <p:nvPr/>
+        </p:nvCxnSpPr>
+        <p:spPr>
+          <a:xfrm flipV="1">
+            <a:off x="5827939" y="3779048"/>
+            <a:ext cx="1831522" cy="481012"/>
+          </a:xfrm>
+          <a:prstGeom prst="straightConnector1">
+            <a:avLst/>
+          </a:prstGeom>
+          <a:ln>
+            <a:headEnd type="triangle"/>
+            <a:tailEnd type="triangle"/>
+          </a:ln>
+        </p:spPr>
+        <p:style>
+          <a:lnRef idx="3">
+            <a:schemeClr val="accent6"/>
+          </a:lnRef>
+          <a:fillRef idx="0">
+            <a:schemeClr val="accent6"/>
+          </a:fillRef>
+          <a:effectRef idx="2">
+            <a:schemeClr val="accent6"/>
+          </a:effectRef>
+          <a:fontRef idx="minor">
+            <a:schemeClr val="tx1"/>
+          </a:fontRef>
+        </p:style>
+      </p:cxnSp>
+      <p:cxnSp>
+        <p:nvCxnSpPr>
+          <p:cNvPr id="19" name="Straight Arrow Connector 18">
+            <a:extLst>
+              <a:ext uri="{FF2B5EF4-FFF2-40B4-BE49-F238E27FC236}">
+                <a16:creationId xmlns:a16="http://schemas.microsoft.com/office/drawing/2014/main" id="{BD6B7F29-E646-4194-8E84-2CB96AEC6B22}"/>
+              </a:ext>
+            </a:extLst>
+          </p:cNvPr>
+          <p:cNvCxnSpPr>
+            <a:cxnSpLocks/>
+          </p:cNvCxnSpPr>
+          <p:nvPr/>
+        </p:nvCxnSpPr>
+        <p:spPr>
+          <a:xfrm flipV="1">
+            <a:off x="5827939" y="2811913"/>
+            <a:ext cx="3954236" cy="967135"/>
+          </a:xfrm>
+          <a:prstGeom prst="straightConnector1">
+            <a:avLst/>
+          </a:prstGeom>
+          <a:ln>
+            <a:headEnd type="triangle"/>
+            <a:tailEnd type="triangle"/>
+          </a:ln>
+        </p:spPr>
+        <p:style>
+          <a:lnRef idx="3">
+            <a:schemeClr val="accent6"/>
+          </a:lnRef>
+          <a:fillRef idx="0">
+            <a:schemeClr val="accent6"/>
+          </a:fillRef>
+          <a:effectRef idx="2">
+            <a:schemeClr val="accent6"/>
+          </a:effectRef>
+          <a:fontRef idx="minor">
+            <a:schemeClr val="tx1"/>
+          </a:fontRef>
+        </p:style>
+      </p:cxnSp>
+      <p:cxnSp>
+        <p:nvCxnSpPr>
+          <p:cNvPr id="20" name="Straight Arrow Connector 19">
+            <a:extLst>
+              <a:ext uri="{FF2B5EF4-FFF2-40B4-BE49-F238E27FC236}">
+                <a16:creationId xmlns:a16="http://schemas.microsoft.com/office/drawing/2014/main" id="{DA4056E3-534D-4F0F-AE4A-4C48C4456994}"/>
+              </a:ext>
+            </a:extLst>
+          </p:cNvPr>
+          <p:cNvCxnSpPr>
+            <a:cxnSpLocks/>
+          </p:cNvCxnSpPr>
+          <p:nvPr/>
+        </p:nvCxnSpPr>
+        <p:spPr>
+          <a:xfrm flipV="1">
+            <a:off x="5827939" y="5374485"/>
+            <a:ext cx="1831522" cy="278612"/>
+          </a:xfrm>
+          <a:prstGeom prst="straightConnector1">
+            <a:avLst/>
+          </a:prstGeom>
+          <a:ln>
+            <a:headEnd type="triangle"/>
+            <a:tailEnd type="triangle"/>
+          </a:ln>
+        </p:spPr>
+        <p:style>
+          <a:lnRef idx="3">
+            <a:schemeClr val="accent6"/>
+          </a:lnRef>
+          <a:fillRef idx="0">
+            <a:schemeClr val="accent6"/>
+          </a:fillRef>
+          <a:effectRef idx="2">
+            <a:schemeClr val="accent6"/>
+          </a:effectRef>
+          <a:fontRef idx="minor">
+            <a:schemeClr val="tx1"/>
+          </a:fontRef>
+        </p:style>
+      </p:cxnSp>
+      <p:cxnSp>
+        <p:nvCxnSpPr>
+          <p:cNvPr id="24" name="Straight Arrow Connector 23">
+            <a:extLst>
+              <a:ext uri="{FF2B5EF4-FFF2-40B4-BE49-F238E27FC236}">
+                <a16:creationId xmlns:a16="http://schemas.microsoft.com/office/drawing/2014/main" id="{00D4D427-90FE-4642-B2C1-F0A5E0D7D2D8}"/>
+              </a:ext>
+            </a:extLst>
+          </p:cNvPr>
+          <p:cNvCxnSpPr>
+            <a:cxnSpLocks/>
+          </p:cNvCxnSpPr>
+          <p:nvPr/>
+        </p:nvCxnSpPr>
+        <p:spPr>
+          <a:xfrm>
+            <a:off x="1911803" y="3782960"/>
+            <a:ext cx="2420711" cy="0"/>
+          </a:xfrm>
+          <a:prstGeom prst="straightConnector1">
+            <a:avLst/>
+          </a:prstGeom>
+          <a:ln>
+            <a:headEnd type="triangle"/>
+            <a:tailEnd type="triangle"/>
+          </a:ln>
+        </p:spPr>
+        <p:style>
+          <a:lnRef idx="3">
+            <a:schemeClr val="accent6"/>
+          </a:lnRef>
+          <a:fillRef idx="0">
+            <a:schemeClr val="accent6"/>
+          </a:fillRef>
+          <a:effectRef idx="2">
+            <a:schemeClr val="accent6"/>
+          </a:effectRef>
+          <a:fontRef idx="minor">
+            <a:schemeClr val="tx1"/>
+          </a:fontRef>
+        </p:style>
+      </p:cxnSp>
+      <p:sp>
+        <p:nvSpPr>
+          <p:cNvPr id="26" name="Footer Placeholder 25">
+            <a:extLst>
+              <a:ext uri="{FF2B5EF4-FFF2-40B4-BE49-F238E27FC236}">
+                <a16:creationId xmlns:a16="http://schemas.microsoft.com/office/drawing/2014/main" id="{93B82A6B-6883-4348-ACF1-3BF2EA319B7C}"/>
+              </a:ext>
+            </a:extLst>
+          </p:cNvPr>
+          <p:cNvSpPr>
+            <a:spLocks noGrp="1"/>
+          </p:cNvSpPr>
+          <p:nvPr>
+            <p:ph type="ftr" sz="quarter" idx="11"/>
+          </p:nvPr>
+        </p:nvSpPr>
+        <p:spPr/>
+        <p:txBody>
+          <a:bodyPr/>
+          <a:lstStyle/>
+          <a:p>
+            <a:r>
+              <a:rPr lang="en-US"/>
+              <a:t>Follow us on https://facebook.com/greenlearner</a:t>
+            </a:r>
+          </a:p>
+        </p:txBody>
+      </p:sp>
+    </p:spTree>
+    <p:extLst>
+      <p:ext uri="{BB962C8B-B14F-4D97-AF65-F5344CB8AC3E}">
         <p14:creationId xmlns:p14="http://schemas.microsoft.com/office/powerpoint/2010/main" val="168082400"/>
       </p:ext>
     </p:extLst>
@@ -14323,7 +15081,7 @@
 </p:sld>
 </file>
 
-<file path=ppt/slides/slide27.xml><?xml version="1.0" encoding="utf-8"?>
+<file path=ppt/slides/slide29.xml><?xml version="1.0" encoding="utf-8"?>
 <p:sld xmlns:a="http://schemas.openxmlformats.org/drawingml/2006/main" xmlns:r="http://schemas.openxmlformats.org/officeDocument/2006/relationships" xmlns:p="http://schemas.openxmlformats.org/presentationml/2006/main">
   <p:cSld>
     <p:spTree>
@@ -19191,4 +19949,47 @@
     </a:folHlink>
   </a:clrScheme>
 </a:themeOverride>
+</file>
+
+<file path=ppt/theme/themeOverride6.xml><?xml version="1.0" encoding="utf-8"?>
+<a:themeOverride xmlns:a="http://schemas.openxmlformats.org/drawingml/2006/main">
+  <a:clrScheme name="AnalogousFromDarkSeedLeftStep">
+    <a:dk1>
+      <a:srgbClr val="000000"/>
+    </a:dk1>
+    <a:lt1>
+      <a:srgbClr val="FFFFFF"/>
+    </a:lt1>
+    <a:dk2>
+      <a:srgbClr val="412434"/>
+    </a:dk2>
+    <a:lt2>
+      <a:srgbClr val="E2E8E7"/>
+    </a:lt2>
+    <a:accent1>
+      <a:srgbClr val="C34D5F"/>
+    </a:accent1>
+    <a:accent2>
+      <a:srgbClr val="B13B7E"/>
+    </a:accent2>
+    <a:accent3>
+      <a:srgbClr val="C34DC2"/>
+    </a:accent3>
+    <a:accent4>
+      <a:srgbClr val="813BB1"/>
+    </a:accent4>
+    <a:accent5>
+      <a:srgbClr val="624DC3"/>
+    </a:accent5>
+    <a:accent6>
+      <a:srgbClr val="3B57B1"/>
+    </a:accent6>
+    <a:hlink>
+      <a:srgbClr val="8763CB"/>
+    </a:hlink>
+    <a:folHlink>
+      <a:srgbClr val="7F7F7F"/>
+    </a:folHlink>
+  </a:clrScheme>
+</a:themeOverride>
 </file>
</xml_diff>